<commit_message>
adding to the documentation
</commit_message>
<xml_diff>
--- a/doc/wa_collisions_final_presentation.pptx
+++ b/doc/wa_collisions_final_presentation.pptx
@@ -5,7 +5,7 @@
     <p:sldMasterId id="2147483648" r:id="rId1"/>
   </p:sldMasterIdLst>
   <p:notesMasterIdLst>
-    <p:notesMasterId r:id="rId17"/>
+    <p:notesMasterId r:id="rId19"/>
   </p:notesMasterIdLst>
   <p:sldIdLst>
     <p:sldId id="275" r:id="rId2"/>
@@ -15,14 +15,16 @@
     <p:sldId id="280" r:id="rId6"/>
     <p:sldId id="281" r:id="rId7"/>
     <p:sldId id="256" r:id="rId8"/>
-    <p:sldId id="271" r:id="rId9"/>
-    <p:sldId id="272" r:id="rId10"/>
-    <p:sldId id="274" r:id="rId11"/>
-    <p:sldId id="283" r:id="rId12"/>
-    <p:sldId id="284" r:id="rId13"/>
-    <p:sldId id="276" r:id="rId14"/>
-    <p:sldId id="273" r:id="rId15"/>
-    <p:sldId id="277" r:id="rId16"/>
+    <p:sldId id="285" r:id="rId9"/>
+    <p:sldId id="271" r:id="rId10"/>
+    <p:sldId id="286" r:id="rId11"/>
+    <p:sldId id="274" r:id="rId12"/>
+    <p:sldId id="283" r:id="rId13"/>
+    <p:sldId id="284" r:id="rId14"/>
+    <p:sldId id="287" r:id="rId15"/>
+    <p:sldId id="276" r:id="rId16"/>
+    <p:sldId id="273" r:id="rId17"/>
+    <p:sldId id="277" r:id="rId18"/>
   </p:sldIdLst>
   <p:sldSz cx="12192000" cy="6858000"/>
   <p:notesSz cx="6858000" cy="9144000"/>
@@ -193,7 +195,7 @@
           </ac:graphicFrameMkLst>
         </pc:graphicFrameChg>
         <pc:picChg chg="add">
-          <ac:chgData name="Geoff Coyner" userId="c41f8547ae985f2b" providerId="LiveId" clId="{7D15DF69-8A33-4A5F-A95C-BD15408E3D01}" dt="2018-06-02T20:15:50.408" v="3643"/>
+          <ac:chgData name="Geoff Coyner" userId="c41f8547ae985f2b" providerId="LiveId" clId="{7D15DF69-8A33-4A5F-A95C-BD15408E3D01}" dt="2018-06-02T20:15:50.408" v="3643" actId="6549"/>
           <ac:picMkLst>
             <pc:docMk/>
             <pc:sldMk cId="2394819103" sldId="256"/>
@@ -774,7 +776,7 @@
           </ac:graphicFrameMkLst>
         </pc:graphicFrameChg>
         <pc:picChg chg="add">
-          <ac:chgData name="Geoff Coyner" userId="c41f8547ae985f2b" providerId="LiveId" clId="{7D15DF69-8A33-4A5F-A95C-BD15408E3D01}" dt="2018-06-02T19:32:03.289" v="1335"/>
+          <ac:chgData name="Geoff Coyner" userId="c41f8547ae985f2b" providerId="LiveId" clId="{7D15DF69-8A33-4A5F-A95C-BD15408E3D01}" dt="2018-06-02T19:32:03.289" v="1335" actId="1076"/>
           <ac:picMkLst>
             <pc:docMk/>
             <pc:sldMk cId="2068212353" sldId="278"/>
@@ -797,7 +799,7 @@
           <pc:sldMk cId="791420198" sldId="279"/>
         </pc:sldMkLst>
         <pc:spChg chg="del">
-          <ac:chgData name="Geoff Coyner" userId="c41f8547ae985f2b" providerId="LiveId" clId="{7D15DF69-8A33-4A5F-A95C-BD15408E3D01}" dt="2018-06-02T19:38:41.897" v="1756"/>
+          <ac:chgData name="Geoff Coyner" userId="c41f8547ae985f2b" providerId="LiveId" clId="{7D15DF69-8A33-4A5F-A95C-BD15408E3D01}" dt="2018-06-02T19:38:41.897" v="1756" actId="47"/>
           <ac:spMkLst>
             <pc:docMk/>
             <pc:sldMk cId="791420198" sldId="279"/>
@@ -820,7 +822,7 @@
           </ac:spMkLst>
         </pc:spChg>
         <pc:spChg chg="del">
-          <ac:chgData name="Geoff Coyner" userId="c41f8547ae985f2b" providerId="LiveId" clId="{7D15DF69-8A33-4A5F-A95C-BD15408E3D01}" dt="2018-06-02T19:38:53.547" v="1767"/>
+          <ac:chgData name="Geoff Coyner" userId="c41f8547ae985f2b" providerId="LiveId" clId="{7D15DF69-8A33-4A5F-A95C-BD15408E3D01}" dt="2018-06-02T19:38:53.547" v="1767" actId="47"/>
           <ac:spMkLst>
             <pc:docMk/>
             <pc:sldMk cId="3222378768" sldId="279"/>
@@ -921,7 +923,7 @@
           <pc:sldMk cId="2990905550" sldId="282"/>
         </pc:sldMkLst>
         <pc:picChg chg="del mod">
-          <ac:chgData name="Geoff Coyner" userId="c41f8547ae985f2b" providerId="LiveId" clId="{7D15DF69-8A33-4A5F-A95C-BD15408E3D01}" dt="2018-06-02T20:08:53.135" v="3312"/>
+          <ac:chgData name="Geoff Coyner" userId="c41f8547ae985f2b" providerId="LiveId" clId="{7D15DF69-8A33-4A5F-A95C-BD15408E3D01}" dt="2018-06-02T20:08:53.135" v="3312" actId="47"/>
           <ac:picMkLst>
             <pc:docMk/>
             <pc:sldMk cId="2990905550" sldId="282"/>
@@ -7637,7 +7639,7 @@
           <a:p>
             <a:fld id="{35F6A2F1-FCFD-42AB-9A88-FE39BC022128}" type="datetimeFigureOut">
               <a:rPr lang="en-US" smtClean="0"/>
-              <a:t>6/2/2018</a:t>
+              <a:t>6/3/2018</a:t>
             </a:fld>
             <a:endParaRPr lang="en-US"/>
           </a:p>
@@ -7992,6 +7994,205 @@
 </p:notes>
 </file>
 
+<file path=ppt/notesSlides/notesSlide10.xml><?xml version="1.0" encoding="utf-8"?>
+<p:notes xmlns:a="http://schemas.openxmlformats.org/drawingml/2006/main" xmlns:r="http://schemas.openxmlformats.org/officeDocument/2006/relationships" xmlns:p="http://schemas.openxmlformats.org/presentationml/2006/main">
+  <p:cSld>
+    <p:spTree>
+      <p:nvGrpSpPr>
+        <p:cNvPr id="1" name=""/>
+        <p:cNvGrpSpPr/>
+        <p:nvPr/>
+      </p:nvGrpSpPr>
+      <p:grpSpPr>
+        <a:xfrm>
+          <a:off x="0" y="0"/>
+          <a:ext cx="0" cy="0"/>
+          <a:chOff x="0" y="0"/>
+          <a:chExt cx="0" cy="0"/>
+        </a:xfrm>
+      </p:grpSpPr>
+      <p:sp>
+        <p:nvSpPr>
+          <p:cNvPr id="2" name="Slide Image Placeholder 1"/>
+          <p:cNvSpPr>
+            <a:spLocks noGrp="1" noRot="1" noChangeAspect="1"/>
+          </p:cNvSpPr>
+          <p:nvPr>
+            <p:ph type="sldImg"/>
+          </p:nvPr>
+        </p:nvSpPr>
+        <p:spPr/>
+      </p:sp>
+      <p:sp>
+        <p:nvSpPr>
+          <p:cNvPr id="3" name="Notes Placeholder 2"/>
+          <p:cNvSpPr>
+            <a:spLocks noGrp="1"/>
+          </p:cNvSpPr>
+          <p:nvPr>
+            <p:ph type="body" idx="1"/>
+          </p:nvPr>
+        </p:nvSpPr>
+        <p:spPr/>
+        <p:txBody>
+          <a:bodyPr/>
+          <a:lstStyle/>
+          <a:p>
+            <a:pPr marL="0" marR="0" lvl="0" indent="0" algn="l" defTabSz="914400" rtl="0" eaLnBrk="1" fontAlgn="auto" latinLnBrk="0" hangingPunct="1">
+              <a:lnSpc>
+                <a:spcPct val="100000"/>
+              </a:lnSpc>
+              <a:spcBef>
+                <a:spcPts val="0"/>
+              </a:spcBef>
+              <a:spcAft>
+                <a:spcPts val="0"/>
+              </a:spcAft>
+              <a:buClrTx/>
+              <a:buSzTx/>
+              <a:buFontTx/>
+              <a:buNone/>
+              <a:tabLst/>
+              <a:defRPr/>
+            </a:pPr>
+            <a:r>
+              <a:rPr lang="en-US" dirty="0"/>
+              <a:t>Monthly # of collision related injuries across </a:t>
+            </a:r>
+            <a:r>
+              <a:rPr lang="en-US" dirty="0" err="1"/>
+              <a:t>Seatle</a:t>
+            </a:r>
+            <a:r>
+              <a:rPr lang="en-US" dirty="0"/>
+              <a:t> neighborhoods</a:t>
+            </a:r>
+          </a:p>
+          <a:p>
+            <a:endParaRPr lang="en-US" dirty="0"/>
+          </a:p>
+        </p:txBody>
+      </p:sp>
+      <p:sp>
+        <p:nvSpPr>
+          <p:cNvPr id="4" name="Slide Number Placeholder 3"/>
+          <p:cNvSpPr>
+            <a:spLocks noGrp="1"/>
+          </p:cNvSpPr>
+          <p:nvPr>
+            <p:ph type="sldNum" sz="quarter" idx="10"/>
+          </p:nvPr>
+        </p:nvSpPr>
+        <p:spPr/>
+        <p:txBody>
+          <a:bodyPr/>
+          <a:lstStyle/>
+          <a:p>
+            <a:fld id="{E67D8E48-E79C-46E6-AEA0-9F19B419B074}" type="slidenum">
+              <a:rPr lang="en-US" smtClean="0"/>
+              <a:t>13</a:t>
+            </a:fld>
+            <a:endParaRPr lang="en-US"/>
+          </a:p>
+        </p:txBody>
+      </p:sp>
+    </p:spTree>
+    <p:extLst>
+      <p:ext uri="{BB962C8B-B14F-4D97-AF65-F5344CB8AC3E}">
+        <p14:creationId xmlns:p14="http://schemas.microsoft.com/office/powerpoint/2010/main" val="4047471142"/>
+      </p:ext>
+    </p:extLst>
+  </p:cSld>
+  <p:clrMapOvr>
+    <a:masterClrMapping/>
+  </p:clrMapOvr>
+</p:notes>
+</file>
+
+<file path=ppt/notesSlides/notesSlide11.xml><?xml version="1.0" encoding="utf-8"?>
+<p:notes xmlns:a="http://schemas.openxmlformats.org/drawingml/2006/main" xmlns:r="http://schemas.openxmlformats.org/officeDocument/2006/relationships" xmlns:p="http://schemas.openxmlformats.org/presentationml/2006/main">
+  <p:cSld>
+    <p:spTree>
+      <p:nvGrpSpPr>
+        <p:cNvPr id="1" name=""/>
+        <p:cNvGrpSpPr/>
+        <p:nvPr/>
+      </p:nvGrpSpPr>
+      <p:grpSpPr>
+        <a:xfrm>
+          <a:off x="0" y="0"/>
+          <a:ext cx="0" cy="0"/>
+          <a:chOff x="0" y="0"/>
+          <a:chExt cx="0" cy="0"/>
+        </a:xfrm>
+      </p:grpSpPr>
+      <p:sp>
+        <p:nvSpPr>
+          <p:cNvPr id="2" name="Slide Image Placeholder 1"/>
+          <p:cNvSpPr>
+            <a:spLocks noGrp="1" noRot="1" noChangeAspect="1"/>
+          </p:cNvSpPr>
+          <p:nvPr>
+            <p:ph type="sldImg"/>
+          </p:nvPr>
+        </p:nvSpPr>
+        <p:spPr/>
+      </p:sp>
+      <p:sp>
+        <p:nvSpPr>
+          <p:cNvPr id="3" name="Notes Placeholder 2"/>
+          <p:cNvSpPr>
+            <a:spLocks noGrp="1"/>
+          </p:cNvSpPr>
+          <p:nvPr>
+            <p:ph type="body" idx="1"/>
+          </p:nvPr>
+        </p:nvSpPr>
+        <p:spPr/>
+        <p:txBody>
+          <a:bodyPr/>
+          <a:lstStyle/>
+          <a:p>
+            <a:endParaRPr lang="en-US" dirty="0"/>
+          </a:p>
+        </p:txBody>
+      </p:sp>
+      <p:sp>
+        <p:nvSpPr>
+          <p:cNvPr id="4" name="Slide Number Placeholder 3"/>
+          <p:cNvSpPr>
+            <a:spLocks noGrp="1"/>
+          </p:cNvSpPr>
+          <p:nvPr>
+            <p:ph type="sldNum" sz="quarter" idx="10"/>
+          </p:nvPr>
+        </p:nvSpPr>
+        <p:spPr/>
+        <p:txBody>
+          <a:bodyPr/>
+          <a:lstStyle/>
+          <a:p>
+            <a:fld id="{E67D8E48-E79C-46E6-AEA0-9F19B419B074}" type="slidenum">
+              <a:rPr lang="en-US" smtClean="0"/>
+              <a:t>14</a:t>
+            </a:fld>
+            <a:endParaRPr lang="en-US"/>
+          </a:p>
+        </p:txBody>
+      </p:sp>
+    </p:spTree>
+    <p:extLst>
+      <p:ext uri="{BB962C8B-B14F-4D97-AF65-F5344CB8AC3E}">
+        <p14:creationId xmlns:p14="http://schemas.microsoft.com/office/powerpoint/2010/main" val="2697383804"/>
+      </p:ext>
+    </p:extLst>
+  </p:cSld>
+  <p:clrMapOvr>
+    <a:masterClrMapping/>
+  </p:clrMapOvr>
+</p:notes>
+</file>
+
 <file path=ppt/notesSlides/notesSlide2.xml><?xml version="1.0" encoding="utf-8"?>
 <p:notes xmlns:a="http://schemas.openxmlformats.org/drawingml/2006/main" xmlns:r="http://schemas.openxmlformats.org/officeDocument/2006/relationships" xmlns:p="http://schemas.openxmlformats.org/presentationml/2006/main">
   <p:cSld>
@@ -8397,10 +8598,7 @@
           <a:bodyPr/>
           <a:lstStyle/>
           <a:p>
-            <a:r>
-              <a:rPr lang="en-US" dirty="0"/>
-              <a:t>Demo notebook: https://github.com/gdc3000/wa_collisions/blob/master/examples/Example%20-%20CausalImpact%20SpeedLimits.ipynb</a:t>
-            </a:r>
+            <a:endParaRPr lang="en-US" dirty="0"/>
           </a:p>
         </p:txBody>
       </p:sp>
@@ -8421,7 +8619,7 @@
           <a:p>
             <a:fld id="{E67D8E48-E79C-46E6-AEA0-9F19B419B074}" type="slidenum">
               <a:rPr lang="en-US" smtClean="0"/>
-              <a:t>10</a:t>
+              <a:t>8</a:t>
             </a:fld>
             <a:endParaRPr lang="en-US"/>
           </a:p>
@@ -8430,7 +8628,7 @@
     </p:spTree>
     <p:extLst>
       <p:ext uri="{BB962C8B-B14F-4D97-AF65-F5344CB8AC3E}">
-        <p14:creationId xmlns:p14="http://schemas.microsoft.com/office/powerpoint/2010/main" val="1041076134"/>
+        <p14:creationId xmlns:p14="http://schemas.microsoft.com/office/powerpoint/2010/main" val="739328489"/>
       </p:ext>
     </p:extLst>
   </p:cSld>
@@ -8484,37 +8682,6 @@
           <a:bodyPr/>
           <a:lstStyle/>
           <a:p>
-            <a:pPr marL="0" marR="0" lvl="0" indent="0" algn="l" defTabSz="914400" rtl="0" eaLnBrk="1" fontAlgn="auto" latinLnBrk="0" hangingPunct="1">
-              <a:lnSpc>
-                <a:spcPct val="100000"/>
-              </a:lnSpc>
-              <a:spcBef>
-                <a:spcPts val="0"/>
-              </a:spcBef>
-              <a:spcAft>
-                <a:spcPts val="0"/>
-              </a:spcAft>
-              <a:buClrTx/>
-              <a:buSzTx/>
-              <a:buFontTx/>
-              <a:buNone/>
-              <a:tabLst/>
-              <a:defRPr/>
-            </a:pPr>
-            <a:r>
-              <a:rPr lang="en-US" dirty="0"/>
-              <a:t>Monthly # of collision related injuries across </a:t>
-            </a:r>
-            <a:r>
-              <a:rPr lang="en-US" dirty="0" err="1"/>
-              <a:t>Seatle</a:t>
-            </a:r>
-            <a:r>
-              <a:rPr lang="en-US" dirty="0"/>
-              <a:t> neighborhoods</a:t>
-            </a:r>
-          </a:p>
-          <a:p>
             <a:endParaRPr lang="en-US" dirty="0"/>
           </a:p>
         </p:txBody>
@@ -8536,7 +8703,7 @@
           <a:p>
             <a:fld id="{E67D8E48-E79C-46E6-AEA0-9F19B419B074}" type="slidenum">
               <a:rPr lang="en-US" smtClean="0"/>
-              <a:t>11</a:t>
+              <a:t>10</a:t>
             </a:fld>
             <a:endParaRPr lang="en-US"/>
           </a:p>
@@ -8545,7 +8712,7 @@
     </p:spTree>
     <p:extLst>
       <p:ext uri="{BB962C8B-B14F-4D97-AF65-F5344CB8AC3E}">
-        <p14:creationId xmlns:p14="http://schemas.microsoft.com/office/powerpoint/2010/main" val="803503429"/>
+        <p14:creationId xmlns:p14="http://schemas.microsoft.com/office/powerpoint/2010/main" val="2408791516"/>
       </p:ext>
     </p:extLst>
   </p:cSld>
@@ -8599,6 +8766,93 @@
           <a:bodyPr/>
           <a:lstStyle/>
           <a:p>
+            <a:r>
+              <a:rPr lang="en-US" dirty="0"/>
+              <a:t>Demo notebook: https://github.com/gdc3000/wa_collisions/blob/master/examples/Example%20-%20CausalImpact%20SpeedLimits.ipynb</a:t>
+            </a:r>
+          </a:p>
+        </p:txBody>
+      </p:sp>
+      <p:sp>
+        <p:nvSpPr>
+          <p:cNvPr id="4" name="Slide Number Placeholder 3"/>
+          <p:cNvSpPr>
+            <a:spLocks noGrp="1"/>
+          </p:cNvSpPr>
+          <p:nvPr>
+            <p:ph type="sldNum" sz="quarter" idx="10"/>
+          </p:nvPr>
+        </p:nvSpPr>
+        <p:spPr/>
+        <p:txBody>
+          <a:bodyPr/>
+          <a:lstStyle/>
+          <a:p>
+            <a:fld id="{E67D8E48-E79C-46E6-AEA0-9F19B419B074}" type="slidenum">
+              <a:rPr lang="en-US" smtClean="0"/>
+              <a:t>11</a:t>
+            </a:fld>
+            <a:endParaRPr lang="en-US"/>
+          </a:p>
+        </p:txBody>
+      </p:sp>
+    </p:spTree>
+    <p:extLst>
+      <p:ext uri="{BB962C8B-B14F-4D97-AF65-F5344CB8AC3E}">
+        <p14:creationId xmlns:p14="http://schemas.microsoft.com/office/powerpoint/2010/main" val="1041076134"/>
+      </p:ext>
+    </p:extLst>
+  </p:cSld>
+  <p:clrMapOvr>
+    <a:masterClrMapping/>
+  </p:clrMapOvr>
+</p:notes>
+</file>
+
+<file path=ppt/notesSlides/notesSlide9.xml><?xml version="1.0" encoding="utf-8"?>
+<p:notes xmlns:a="http://schemas.openxmlformats.org/drawingml/2006/main" xmlns:r="http://schemas.openxmlformats.org/officeDocument/2006/relationships" xmlns:p="http://schemas.openxmlformats.org/presentationml/2006/main">
+  <p:cSld>
+    <p:spTree>
+      <p:nvGrpSpPr>
+        <p:cNvPr id="1" name=""/>
+        <p:cNvGrpSpPr/>
+        <p:nvPr/>
+      </p:nvGrpSpPr>
+      <p:grpSpPr>
+        <a:xfrm>
+          <a:off x="0" y="0"/>
+          <a:ext cx="0" cy="0"/>
+          <a:chOff x="0" y="0"/>
+          <a:chExt cx="0" cy="0"/>
+        </a:xfrm>
+      </p:grpSpPr>
+      <p:sp>
+        <p:nvSpPr>
+          <p:cNvPr id="2" name="Slide Image Placeholder 1"/>
+          <p:cNvSpPr>
+            <a:spLocks noGrp="1" noRot="1" noChangeAspect="1"/>
+          </p:cNvSpPr>
+          <p:nvPr>
+            <p:ph type="sldImg"/>
+          </p:nvPr>
+        </p:nvSpPr>
+        <p:spPr/>
+      </p:sp>
+      <p:sp>
+        <p:nvSpPr>
+          <p:cNvPr id="3" name="Notes Placeholder 2"/>
+          <p:cNvSpPr>
+            <a:spLocks noGrp="1"/>
+          </p:cNvSpPr>
+          <p:nvPr>
+            <p:ph type="body" idx="1"/>
+          </p:nvPr>
+        </p:nvSpPr>
+        <p:spPr/>
+        <p:txBody>
+          <a:bodyPr/>
+          <a:lstStyle/>
+          <a:p>
             <a:pPr marL="0" marR="0" lvl="0" indent="0" algn="l" defTabSz="914400" rtl="0" eaLnBrk="1" fontAlgn="auto" latinLnBrk="0" hangingPunct="1">
               <a:lnSpc>
                 <a:spcPct val="100000"/>
@@ -8660,7 +8914,7 @@
     </p:spTree>
     <p:extLst>
       <p:ext uri="{BB962C8B-B14F-4D97-AF65-F5344CB8AC3E}">
-        <p14:creationId xmlns:p14="http://schemas.microsoft.com/office/powerpoint/2010/main" val="4047471142"/>
+        <p14:creationId xmlns:p14="http://schemas.microsoft.com/office/powerpoint/2010/main" val="803503429"/>
       </p:ext>
     </p:extLst>
   </p:cSld>
@@ -8817,7 +9071,7 @@
           <a:p>
             <a:fld id="{396E796B-D345-4ABC-AD98-EB7FED270790}" type="datetimeFigureOut">
               <a:rPr lang="en-US" smtClean="0"/>
-              <a:t>6/2/2018</a:t>
+              <a:t>6/3/2018</a:t>
             </a:fld>
             <a:endParaRPr lang="en-US"/>
           </a:p>
@@ -9015,7 +9269,7 @@
           <a:p>
             <a:fld id="{396E796B-D345-4ABC-AD98-EB7FED270790}" type="datetimeFigureOut">
               <a:rPr lang="en-US" smtClean="0"/>
-              <a:t>6/2/2018</a:t>
+              <a:t>6/3/2018</a:t>
             </a:fld>
             <a:endParaRPr lang="en-US"/>
           </a:p>
@@ -9223,7 +9477,7 @@
           <a:p>
             <a:fld id="{396E796B-D345-4ABC-AD98-EB7FED270790}" type="datetimeFigureOut">
               <a:rPr lang="en-US" smtClean="0"/>
-              <a:t>6/2/2018</a:t>
+              <a:t>6/3/2018</a:t>
             </a:fld>
             <a:endParaRPr lang="en-US"/>
           </a:p>
@@ -9421,7 +9675,7 @@
           <a:p>
             <a:fld id="{396E796B-D345-4ABC-AD98-EB7FED270790}" type="datetimeFigureOut">
               <a:rPr lang="en-US" smtClean="0"/>
-              <a:t>6/2/2018</a:t>
+              <a:t>6/3/2018</a:t>
             </a:fld>
             <a:endParaRPr lang="en-US"/>
           </a:p>
@@ -9696,7 +9950,7 @@
           <a:p>
             <a:fld id="{396E796B-D345-4ABC-AD98-EB7FED270790}" type="datetimeFigureOut">
               <a:rPr lang="en-US" smtClean="0"/>
-              <a:t>6/2/2018</a:t>
+              <a:t>6/3/2018</a:t>
             </a:fld>
             <a:endParaRPr lang="en-US"/>
           </a:p>
@@ -9961,7 +10215,7 @@
           <a:p>
             <a:fld id="{396E796B-D345-4ABC-AD98-EB7FED270790}" type="datetimeFigureOut">
               <a:rPr lang="en-US" smtClean="0"/>
-              <a:t>6/2/2018</a:t>
+              <a:t>6/3/2018</a:t>
             </a:fld>
             <a:endParaRPr lang="en-US"/>
           </a:p>
@@ -10373,7 +10627,7 @@
           <a:p>
             <a:fld id="{396E796B-D345-4ABC-AD98-EB7FED270790}" type="datetimeFigureOut">
               <a:rPr lang="en-US" smtClean="0"/>
-              <a:t>6/2/2018</a:t>
+              <a:t>6/3/2018</a:t>
             </a:fld>
             <a:endParaRPr lang="en-US"/>
           </a:p>
@@ -10514,7 +10768,7 @@
           <a:p>
             <a:fld id="{396E796B-D345-4ABC-AD98-EB7FED270790}" type="datetimeFigureOut">
               <a:rPr lang="en-US" smtClean="0"/>
-              <a:t>6/2/2018</a:t>
+              <a:t>6/3/2018</a:t>
             </a:fld>
             <a:endParaRPr lang="en-US"/>
           </a:p>
@@ -10627,7 +10881,7 @@
           <a:p>
             <a:fld id="{396E796B-D345-4ABC-AD98-EB7FED270790}" type="datetimeFigureOut">
               <a:rPr lang="en-US" smtClean="0"/>
-              <a:t>6/2/2018</a:t>
+              <a:t>6/3/2018</a:t>
             </a:fld>
             <a:endParaRPr lang="en-US"/>
           </a:p>
@@ -10938,7 +11192,7 @@
           <a:p>
             <a:fld id="{396E796B-D345-4ABC-AD98-EB7FED270790}" type="datetimeFigureOut">
               <a:rPr lang="en-US" smtClean="0"/>
-              <a:t>6/2/2018</a:t>
+              <a:t>6/3/2018</a:t>
             </a:fld>
             <a:endParaRPr lang="en-US"/>
           </a:p>
@@ -11226,7 +11480,7 @@
           <a:p>
             <a:fld id="{396E796B-D345-4ABC-AD98-EB7FED270790}" type="datetimeFigureOut">
               <a:rPr lang="en-US" smtClean="0"/>
-              <a:t>6/2/2018</a:t>
+              <a:t>6/3/2018</a:t>
             </a:fld>
             <a:endParaRPr lang="en-US"/>
           </a:p>
@@ -11467,7 +11721,7 @@
           <a:p>
             <a:fld id="{396E796B-D345-4ABC-AD98-EB7FED270790}" type="datetimeFigureOut">
               <a:rPr lang="en-US" smtClean="0"/>
-              <a:t>6/2/2018</a:t>
+              <a:t>6/3/2018</a:t>
             </a:fld>
             <a:endParaRPr lang="en-US"/>
           </a:p>
@@ -12059,7 +12313,7 @@
       </p:grpSpPr>
       <p:sp>
         <p:nvSpPr>
-          <p:cNvPr id="20" name="Rectangle 19">
+          <p:cNvPr id="14" name="Rectangle 9">
             <a:extLst>
               <a:ext uri="{FF2B5EF4-FFF2-40B4-BE49-F238E27FC236}">
                 <a16:creationId xmlns:a16="http://schemas.microsoft.com/office/drawing/2014/main" id="{867D4867-5BA7-4462-B2F6-A23F4A622AA7}"/>
@@ -12123,6 +12377,242 @@
       </p:sp>
       <p:pic>
         <p:nvPicPr>
+          <p:cNvPr id="4" name="Picture 3">
+            <a:extLst>
+              <a:ext uri="{FF2B5EF4-FFF2-40B4-BE49-F238E27FC236}">
+                <a16:creationId xmlns:a16="http://schemas.microsoft.com/office/drawing/2014/main" id="{9CD1F9FE-1CDD-45F3-8601-F2710480B264}"/>
+              </a:ext>
+            </a:extLst>
+          </p:cNvPr>
+          <p:cNvPicPr>
+            <a:picLocks noChangeAspect="1"/>
+          </p:cNvPicPr>
+          <p:nvPr/>
+        </p:nvPicPr>
+        <p:blipFill>
+          <a:blip r:embed="rId3"/>
+          <a:stretch>
+            <a:fillRect/>
+          </a:stretch>
+        </p:blipFill>
+        <p:spPr>
+          <a:xfrm>
+            <a:off x="10400306" y="1"/>
+            <a:ext cx="1791693" cy="1007828"/>
+          </a:xfrm>
+          <a:prstGeom prst="rect">
+            <a:avLst/>
+          </a:prstGeom>
+        </p:spPr>
+      </p:pic>
+      <p:sp>
+        <p:nvSpPr>
+          <p:cNvPr id="2" name="Title 1">
+            <a:extLst>
+              <a:ext uri="{FF2B5EF4-FFF2-40B4-BE49-F238E27FC236}">
+                <a16:creationId xmlns:a16="http://schemas.microsoft.com/office/drawing/2014/main" id="{421649CD-C4DB-4A73-B411-9C060ECFEEA6}"/>
+              </a:ext>
+            </a:extLst>
+          </p:cNvPr>
+          <p:cNvSpPr>
+            <a:spLocks noGrp="1"/>
+          </p:cNvSpPr>
+          <p:nvPr>
+            <p:ph type="title"/>
+          </p:nvPr>
+        </p:nvSpPr>
+        <p:spPr>
+          <a:xfrm>
+            <a:off x="643467" y="643467"/>
+            <a:ext cx="3363974" cy="1597315"/>
+          </a:xfrm>
+          <a:noFill/>
+          <a:ln w="19050">
+            <a:solidFill>
+              <a:schemeClr val="bg1"/>
+            </a:solidFill>
+          </a:ln>
+        </p:spPr>
+        <p:txBody>
+          <a:bodyPr wrap="square">
+            <a:normAutofit/>
+          </a:bodyPr>
+          <a:lstStyle/>
+          <a:p>
+            <a:pPr algn="ctr"/>
+            <a:r>
+              <a:rPr lang="en-US" sz="2800" b="1" dirty="0">
+                <a:solidFill>
+                  <a:schemeClr val="bg1"/>
+                </a:solidFill>
+              </a:rPr>
+              <a:t>Demo: Visualize Neighborhoods</a:t>
+            </a:r>
+            <a:endParaRPr lang="en-US" sz="2800" dirty="0">
+              <a:solidFill>
+                <a:schemeClr val="bg1"/>
+              </a:solidFill>
+            </a:endParaRPr>
+          </a:p>
+        </p:txBody>
+      </p:sp>
+      <p:sp>
+        <p:nvSpPr>
+          <p:cNvPr id="3" name="Content Placeholder 2">
+            <a:extLst>
+              <a:ext uri="{FF2B5EF4-FFF2-40B4-BE49-F238E27FC236}">
+                <a16:creationId xmlns:a16="http://schemas.microsoft.com/office/drawing/2014/main" id="{94ED32F1-C444-403D-9DB8-EDC87E620384}"/>
+              </a:ext>
+            </a:extLst>
+          </p:cNvPr>
+          <p:cNvSpPr>
+            <a:spLocks noGrp="1"/>
+          </p:cNvSpPr>
+          <p:nvPr>
+            <p:ph idx="1"/>
+          </p:nvPr>
+        </p:nvSpPr>
+        <p:spPr>
+          <a:xfrm>
+            <a:off x="643468" y="2638044"/>
+            <a:ext cx="3363974" cy="3921376"/>
+          </a:xfrm>
+        </p:spPr>
+        <p:txBody>
+          <a:bodyPr>
+            <a:normAutofit/>
+          </a:bodyPr>
+          <a:lstStyle/>
+          <a:p>
+            <a:r>
+              <a:rPr lang="en-US" sz="2000" dirty="0">
+                <a:solidFill>
+                  <a:schemeClr val="bg1"/>
+                </a:solidFill>
+              </a:rPr>
+              <a:t>Visualize </a:t>
+            </a:r>
+          </a:p>
+          <a:p>
+            <a:endParaRPr lang="en-US" sz="2000" dirty="0">
+              <a:solidFill>
+                <a:schemeClr val="bg1"/>
+              </a:solidFill>
+            </a:endParaRPr>
+          </a:p>
+          <a:p>
+            <a:endParaRPr lang="en-US" sz="2000" dirty="0">
+              <a:solidFill>
+                <a:schemeClr val="bg1"/>
+              </a:solidFill>
+            </a:endParaRPr>
+          </a:p>
+        </p:txBody>
+      </p:sp>
+    </p:spTree>
+    <p:extLst>
+      <p:ext uri="{BB962C8B-B14F-4D97-AF65-F5344CB8AC3E}">
+        <p14:creationId xmlns:p14="http://schemas.microsoft.com/office/powerpoint/2010/main" val="2871267136"/>
+      </p:ext>
+    </p:extLst>
+  </p:cSld>
+  <p:clrMapOvr>
+    <a:masterClrMapping/>
+  </p:clrMapOvr>
+</p:sld>
+</file>
+
+<file path=ppt/slides/slide11.xml><?xml version="1.0" encoding="utf-8"?>
+<p:sld xmlns:a="http://schemas.openxmlformats.org/drawingml/2006/main" xmlns:r="http://schemas.openxmlformats.org/officeDocument/2006/relationships" xmlns:p="http://schemas.openxmlformats.org/presentationml/2006/main">
+  <p:cSld>
+    <p:bg>
+      <p:bgPr>
+        <a:solidFill>
+          <a:schemeClr val="bg1"/>
+        </a:solidFill>
+        <a:effectLst/>
+      </p:bgPr>
+    </p:bg>
+    <p:spTree>
+      <p:nvGrpSpPr>
+        <p:cNvPr id="1" name=""/>
+        <p:cNvGrpSpPr/>
+        <p:nvPr/>
+      </p:nvGrpSpPr>
+      <p:grpSpPr>
+        <a:xfrm>
+          <a:off x="0" y="0"/>
+          <a:ext cx="0" cy="0"/>
+          <a:chOff x="0" y="0"/>
+          <a:chExt cx="0" cy="0"/>
+        </a:xfrm>
+      </p:grpSpPr>
+      <p:sp>
+        <p:nvSpPr>
+          <p:cNvPr id="20" name="Rectangle 19">
+            <a:extLst>
+              <a:ext uri="{FF2B5EF4-FFF2-40B4-BE49-F238E27FC236}">
+                <a16:creationId xmlns:a16="http://schemas.microsoft.com/office/drawing/2014/main" id="{867D4867-5BA7-4462-B2F6-A23F4A622AA7}"/>
+              </a:ext>
+              <a:ext uri="{C183D7F6-B498-43B3-948B-1728B52AA6E4}">
+                <adec:decorative xmlns:adec="http://schemas.microsoft.com/office/drawing/2017/decorative" val="1"/>
+              </a:ext>
+            </a:extLst>
+          </p:cNvPr>
+          <p:cNvSpPr>
+            <a:spLocks noGrp="1" noRot="1" noChangeAspect="1" noMove="1" noResize="1" noEditPoints="1" noAdjustHandles="1" noChangeArrowheads="1" noChangeShapeType="1" noTextEdit="1"/>
+          </p:cNvSpPr>
+          <p:nvPr>
+            <p:extLst>
+              <p:ext uri="{386F3935-93C4-4BCD-93E2-E3B085C9AB24}">
+                <p16:designElem xmlns:p16="http://schemas.microsoft.com/office/powerpoint/2015/main" val="1"/>
+              </p:ext>
+            </p:extLst>
+          </p:nvPr>
+        </p:nvSpPr>
+        <p:spPr>
+          <a:xfrm>
+            <a:off x="0" y="0"/>
+            <a:ext cx="4654296" cy="6858000"/>
+          </a:xfrm>
+          <a:prstGeom prst="rect">
+            <a:avLst/>
+          </a:prstGeom>
+          <a:solidFill>
+            <a:schemeClr val="tx1">
+              <a:lumMod val="75000"/>
+              <a:lumOff val="25000"/>
+            </a:schemeClr>
+          </a:solidFill>
+          <a:ln>
+            <a:noFill/>
+          </a:ln>
+        </p:spPr>
+        <p:style>
+          <a:lnRef idx="0">
+            <a:scrgbClr r="0" g="0" b="0"/>
+          </a:lnRef>
+          <a:fillRef idx="0">
+            <a:scrgbClr r="0" g="0" b="0"/>
+          </a:fillRef>
+          <a:effectRef idx="0">
+            <a:scrgbClr r="0" g="0" b="0"/>
+          </a:effectRef>
+          <a:fontRef idx="minor">
+            <a:schemeClr val="lt1"/>
+          </a:fontRef>
+        </p:style>
+        <p:txBody>
+          <a:bodyPr rtlCol="0" anchor="ctr"/>
+          <a:lstStyle/>
+          <a:p>
+            <a:pPr algn="ctr"/>
+            <a:endParaRPr lang="en-US"/>
+          </a:p>
+        </p:txBody>
+      </p:sp>
+      <p:pic>
+        <p:nvPicPr>
           <p:cNvPr id="5" name="Picture 4">
             <a:extLst>
               <a:ext uri="{FF2B5EF4-FFF2-40B4-BE49-F238E27FC236}">
@@ -12344,7 +12834,7 @@
 </p:sld>
 </file>
 
-<file path=ppt/slides/slide11.xml><?xml version="1.0" encoding="utf-8"?>
+<file path=ppt/slides/slide12.xml><?xml version="1.0" encoding="utf-8"?>
 <p:sld xmlns:a="http://schemas.openxmlformats.org/drawingml/2006/main" xmlns:r="http://schemas.openxmlformats.org/officeDocument/2006/relationships" xmlns:p="http://schemas.openxmlformats.org/presentationml/2006/main">
   <p:cSld>
     <p:bg>
@@ -12852,7 +13342,7 @@
 </p:sld>
 </file>
 
-<file path=ppt/slides/slide12.xml><?xml version="1.0" encoding="utf-8"?>
+<file path=ppt/slides/slide13.xml><?xml version="1.0" encoding="utf-8"?>
 <p:sld xmlns:a="http://schemas.openxmlformats.org/drawingml/2006/main" xmlns:r="http://schemas.openxmlformats.org/officeDocument/2006/relationships" xmlns:p="http://schemas.openxmlformats.org/presentationml/2006/main">
   <p:cSld>
     <p:bg>
@@ -13264,9 +13754,17 @@
 </p:sld>
 </file>
 
-<file path=ppt/slides/slide13.xml><?xml version="1.0" encoding="utf-8"?>
+<file path=ppt/slides/slide14.xml><?xml version="1.0" encoding="utf-8"?>
 <p:sld xmlns:a="http://schemas.openxmlformats.org/drawingml/2006/main" xmlns:r="http://schemas.openxmlformats.org/officeDocument/2006/relationships" xmlns:p="http://schemas.openxmlformats.org/presentationml/2006/main">
   <p:cSld>
+    <p:bg>
+      <p:bgPr>
+        <a:solidFill>
+          <a:schemeClr val="bg1"/>
+        </a:solidFill>
+        <a:effectLst/>
+      </p:bgPr>
+    </p:bg>
     <p:spTree>
       <p:nvGrpSpPr>
         <p:cNvPr id="1" name=""/>
@@ -13283,10 +13781,104 @@
       </p:grpSpPr>
       <p:sp>
         <p:nvSpPr>
+          <p:cNvPr id="14" name="Rectangle 9">
+            <a:extLst>
+              <a:ext uri="{FF2B5EF4-FFF2-40B4-BE49-F238E27FC236}">
+                <a16:creationId xmlns:a16="http://schemas.microsoft.com/office/drawing/2014/main" id="{867D4867-5BA7-4462-B2F6-A23F4A622AA7}"/>
+              </a:ext>
+              <a:ext uri="{C183D7F6-B498-43B3-948B-1728B52AA6E4}">
+                <adec:decorative xmlns:adec="http://schemas.microsoft.com/office/drawing/2017/decorative" val="1"/>
+              </a:ext>
+            </a:extLst>
+          </p:cNvPr>
+          <p:cNvSpPr>
+            <a:spLocks noGrp="1" noRot="1" noChangeAspect="1" noMove="1" noResize="1" noEditPoints="1" noAdjustHandles="1" noChangeArrowheads="1" noChangeShapeType="1" noTextEdit="1"/>
+          </p:cNvSpPr>
+          <p:nvPr>
+            <p:extLst>
+              <p:ext uri="{386F3935-93C4-4BCD-93E2-E3B085C9AB24}">
+                <p16:designElem xmlns:p16="http://schemas.microsoft.com/office/powerpoint/2015/main" val="1"/>
+              </p:ext>
+            </p:extLst>
+          </p:nvPr>
+        </p:nvSpPr>
+        <p:spPr>
+          <a:xfrm>
+            <a:off x="0" y="0"/>
+            <a:ext cx="4654296" cy="6858000"/>
+          </a:xfrm>
+          <a:prstGeom prst="rect">
+            <a:avLst/>
+          </a:prstGeom>
+          <a:solidFill>
+            <a:schemeClr val="tx1">
+              <a:lumMod val="75000"/>
+              <a:lumOff val="25000"/>
+            </a:schemeClr>
+          </a:solidFill>
+          <a:ln>
+            <a:noFill/>
+          </a:ln>
+        </p:spPr>
+        <p:style>
+          <a:lnRef idx="0">
+            <a:scrgbClr r="0" g="0" b="0"/>
+          </a:lnRef>
+          <a:fillRef idx="0">
+            <a:scrgbClr r="0" g="0" b="0"/>
+          </a:fillRef>
+          <a:effectRef idx="0">
+            <a:scrgbClr r="0" g="0" b="0"/>
+          </a:effectRef>
+          <a:fontRef idx="minor">
+            <a:schemeClr val="lt1"/>
+          </a:fontRef>
+        </p:style>
+        <p:txBody>
+          <a:bodyPr rtlCol="0" anchor="ctr"/>
+          <a:lstStyle/>
+          <a:p>
+            <a:pPr algn="ctr"/>
+            <a:endParaRPr lang="en-US"/>
+          </a:p>
+        </p:txBody>
+      </p:sp>
+      <p:pic>
+        <p:nvPicPr>
+          <p:cNvPr id="4" name="Picture 3">
+            <a:extLst>
+              <a:ext uri="{FF2B5EF4-FFF2-40B4-BE49-F238E27FC236}">
+                <a16:creationId xmlns:a16="http://schemas.microsoft.com/office/drawing/2014/main" id="{9CD1F9FE-1CDD-45F3-8601-F2710480B264}"/>
+              </a:ext>
+            </a:extLst>
+          </p:cNvPr>
+          <p:cNvPicPr>
+            <a:picLocks noChangeAspect="1"/>
+          </p:cNvPicPr>
+          <p:nvPr/>
+        </p:nvPicPr>
+        <p:blipFill>
+          <a:blip r:embed="rId3"/>
+          <a:stretch>
+            <a:fillRect/>
+          </a:stretch>
+        </p:blipFill>
+        <p:spPr>
+          <a:xfrm>
+            <a:off x="10400306" y="1"/>
+            <a:ext cx="1791693" cy="1007828"/>
+          </a:xfrm>
+          <a:prstGeom prst="rect">
+            <a:avLst/>
+          </a:prstGeom>
+        </p:spPr>
+      </p:pic>
+      <p:sp>
+        <p:nvSpPr>
           <p:cNvPr id="2" name="Title 1">
             <a:extLst>
               <a:ext uri="{FF2B5EF4-FFF2-40B4-BE49-F238E27FC236}">
-                <a16:creationId xmlns:a16="http://schemas.microsoft.com/office/drawing/2014/main" id="{B17F1AEA-475D-42AF-948E-43E970D9EC1B}"/>
+                <a16:creationId xmlns:a16="http://schemas.microsoft.com/office/drawing/2014/main" id="{421649CD-C4DB-4A73-B411-9C060ECFEEA6}"/>
               </a:ext>
             </a:extLst>
           </p:cNvPr>
@@ -13297,13 +13889,31 @@
             <p:ph type="title"/>
           </p:nvPr>
         </p:nvSpPr>
-        <p:spPr/>
+        <p:spPr>
+          <a:xfrm>
+            <a:off x="643467" y="643467"/>
+            <a:ext cx="3363974" cy="1597315"/>
+          </a:xfrm>
+          <a:noFill/>
+          <a:ln w="19050">
+            <a:solidFill>
+              <a:schemeClr val="bg1"/>
+            </a:solidFill>
+          </a:ln>
+        </p:spPr>
         <p:txBody>
-          <a:bodyPr/>
+          <a:bodyPr wrap="square">
+            <a:normAutofit/>
+          </a:bodyPr>
           <a:lstStyle/>
           <a:p>
+            <a:pPr algn="ctr"/>
             <a:r>
-              <a:rPr lang="en-US" dirty="0"/>
+              <a:rPr lang="en-US" sz="2800" dirty="0">
+                <a:solidFill>
+                  <a:schemeClr val="bg1"/>
+                </a:solidFill>
+              </a:rPr>
               <a:t>Project Structure</a:t>
             </a:r>
           </a:p>
@@ -13314,7 +13924,7 @@
           <p:cNvPr id="3" name="Content Placeholder 2">
             <a:extLst>
               <a:ext uri="{FF2B5EF4-FFF2-40B4-BE49-F238E27FC236}">
-                <a16:creationId xmlns:a16="http://schemas.microsoft.com/office/drawing/2014/main" id="{BADEF35E-EDB9-4B1D-8EC4-086A1B8013DB}"/>
+                <a16:creationId xmlns:a16="http://schemas.microsoft.com/office/drawing/2014/main" id="{94ED32F1-C444-403D-9DB8-EDC87E620384}"/>
               </a:ext>
             </a:extLst>
           </p:cNvPr>
@@ -13325,51 +13935,55 @@
             <p:ph idx="1"/>
           </p:nvPr>
         </p:nvSpPr>
-        <p:spPr/>
-        <p:txBody>
-          <a:bodyPr/>
-          <a:lstStyle/>
-          <a:p>
-            <a:endParaRPr lang="en-US"/>
-          </a:p>
-        </p:txBody>
-      </p:sp>
-      <p:sp>
-        <p:nvSpPr>
-          <p:cNvPr id="4" name="TextBox 3">
-            <a:extLst>
-              <a:ext uri="{FF2B5EF4-FFF2-40B4-BE49-F238E27FC236}">
-                <a16:creationId xmlns:a16="http://schemas.microsoft.com/office/drawing/2014/main" id="{B85C378E-F702-4DF5-8F8E-E9FB4FF7428C}"/>
-              </a:ext>
-            </a:extLst>
-          </p:cNvPr>
-          <p:cNvSpPr txBox="1"/>
-          <p:nvPr/>
-        </p:nvSpPr>
         <p:spPr>
           <a:xfrm>
-            <a:off x="2528514" y="2108468"/>
-            <a:ext cx="6909684" cy="3785652"/>
+            <a:off x="643468" y="2638044"/>
+            <a:ext cx="3363974" cy="3415622"/>
           </a:xfrm>
-          <a:prstGeom prst="rect">
-            <a:avLst/>
-          </a:prstGeom>
-          <a:solidFill>
-            <a:schemeClr val="accent6">
-              <a:lumMod val="40000"/>
-              <a:lumOff val="60000"/>
-            </a:schemeClr>
-          </a:solidFill>
         </p:spPr>
         <p:txBody>
-          <a:bodyPr wrap="square" rtlCol="0">
-            <a:spAutoFit/>
+          <a:bodyPr>
+            <a:normAutofit/>
           </a:bodyPr>
           <a:lstStyle/>
           <a:p>
             <a:r>
-              <a:rPr lang="en-US" sz="8000" dirty="0"/>
-              <a:t>Libby to add content from Readme?</a:t>
+              <a:rPr lang="en-US" sz="2000">
+                <a:solidFill>
+                  <a:schemeClr val="bg1"/>
+                </a:solidFill>
+              </a:rPr>
+              <a:t>Downloaded from Seattle GIS open data portal</a:t>
+            </a:r>
+          </a:p>
+          <a:p>
+            <a:r>
+              <a:rPr lang="en-US" sz="2000">
+                <a:solidFill>
+                  <a:schemeClr val="bg1"/>
+                </a:solidFill>
+              </a:rPr>
+              <a:t>Provides 48 attributes for Seattle collisions since 2004</a:t>
+            </a:r>
+          </a:p>
+          <a:p>
+            <a:r>
+              <a:rPr lang="en-US" sz="2000">
+                <a:solidFill>
+                  <a:schemeClr val="bg1"/>
+                </a:solidFill>
+              </a:rPr>
+              <a:t>Majority of collisions include exact geo-coordinates.</a:t>
+            </a:r>
+          </a:p>
+          <a:p>
+            <a:r>
+              <a:rPr lang="en-US" sz="2000">
+                <a:solidFill>
+                  <a:schemeClr val="bg1"/>
+                </a:solidFill>
+              </a:rPr>
+              <a:t>Includes a weather attribute but it’s sparsely populated and qualitative.</a:t>
             </a:r>
           </a:p>
         </p:txBody>
@@ -13377,130 +13991,7 @@
     </p:spTree>
     <p:extLst>
       <p:ext uri="{BB962C8B-B14F-4D97-AF65-F5344CB8AC3E}">
-        <p14:creationId xmlns:p14="http://schemas.microsoft.com/office/powerpoint/2010/main" val="1209367033"/>
-      </p:ext>
-    </p:extLst>
-  </p:cSld>
-  <p:clrMapOvr>
-    <a:masterClrMapping/>
-  </p:clrMapOvr>
-</p:sld>
-</file>
-
-<file path=ppt/slides/slide14.xml><?xml version="1.0" encoding="utf-8"?>
-<p:sld xmlns:a="http://schemas.openxmlformats.org/drawingml/2006/main" xmlns:r="http://schemas.openxmlformats.org/officeDocument/2006/relationships" xmlns:p="http://schemas.openxmlformats.org/presentationml/2006/main">
-  <p:cSld>
-    <p:spTree>
-      <p:nvGrpSpPr>
-        <p:cNvPr id="1" name=""/>
-        <p:cNvGrpSpPr/>
-        <p:nvPr/>
-      </p:nvGrpSpPr>
-      <p:grpSpPr>
-        <a:xfrm>
-          <a:off x="0" y="0"/>
-          <a:ext cx="0" cy="0"/>
-          <a:chOff x="0" y="0"/>
-          <a:chExt cx="0" cy="0"/>
-        </a:xfrm>
-      </p:grpSpPr>
-      <p:sp>
-        <p:nvSpPr>
-          <p:cNvPr id="2" name="Title 1">
-            <a:extLst>
-              <a:ext uri="{FF2B5EF4-FFF2-40B4-BE49-F238E27FC236}">
-                <a16:creationId xmlns:a16="http://schemas.microsoft.com/office/drawing/2014/main" id="{032B74C4-DBA1-4921-877B-2D81F3E48B4D}"/>
-              </a:ext>
-            </a:extLst>
-          </p:cNvPr>
-          <p:cNvSpPr>
-            <a:spLocks noGrp="1"/>
-          </p:cNvSpPr>
-          <p:nvPr>
-            <p:ph type="title"/>
-          </p:nvPr>
-        </p:nvSpPr>
-        <p:spPr/>
-        <p:txBody>
-          <a:bodyPr/>
-          <a:lstStyle/>
-          <a:p>
-            <a:r>
-              <a:rPr lang="en-US" dirty="0"/>
-              <a:t>Lessons Learned </a:t>
-            </a:r>
-          </a:p>
-        </p:txBody>
-      </p:sp>
-      <p:sp>
-        <p:nvSpPr>
-          <p:cNvPr id="3" name="Content Placeholder 2">
-            <a:extLst>
-              <a:ext uri="{FF2B5EF4-FFF2-40B4-BE49-F238E27FC236}">
-                <a16:creationId xmlns:a16="http://schemas.microsoft.com/office/drawing/2014/main" id="{92120D19-981E-4F1F-AB0E-F377E5C5FB01}"/>
-              </a:ext>
-            </a:extLst>
-          </p:cNvPr>
-          <p:cNvSpPr>
-            <a:spLocks noGrp="1"/>
-          </p:cNvSpPr>
-          <p:nvPr>
-            <p:ph idx="1"/>
-          </p:nvPr>
-        </p:nvSpPr>
-        <p:spPr/>
-        <p:txBody>
-          <a:bodyPr/>
-          <a:lstStyle/>
-          <a:p>
-            <a:endParaRPr lang="en-US"/>
-          </a:p>
-        </p:txBody>
-      </p:sp>
-      <p:sp>
-        <p:nvSpPr>
-          <p:cNvPr id="4" name="TextBox 3">
-            <a:extLst>
-              <a:ext uri="{FF2B5EF4-FFF2-40B4-BE49-F238E27FC236}">
-                <a16:creationId xmlns:a16="http://schemas.microsoft.com/office/drawing/2014/main" id="{41C664C5-F9E9-4F7E-AD36-B44F79DDDD99}"/>
-              </a:ext>
-            </a:extLst>
-          </p:cNvPr>
-          <p:cNvSpPr txBox="1"/>
-          <p:nvPr/>
-        </p:nvSpPr>
-        <p:spPr>
-          <a:xfrm>
-            <a:off x="2528514" y="2108468"/>
-            <a:ext cx="6909684" cy="2554545"/>
-          </a:xfrm>
-          <a:prstGeom prst="rect">
-            <a:avLst/>
-          </a:prstGeom>
-          <a:solidFill>
-            <a:schemeClr val="accent6">
-              <a:lumMod val="40000"/>
-              <a:lumOff val="60000"/>
-            </a:schemeClr>
-          </a:solidFill>
-        </p:spPr>
-        <p:txBody>
-          <a:bodyPr wrap="square" rtlCol="0">
-            <a:spAutoFit/>
-          </a:bodyPr>
-          <a:lstStyle/>
-          <a:p>
-            <a:r>
-              <a:rPr lang="en-US" sz="8000" dirty="0"/>
-              <a:t>Salik, Fei, Libby to add content</a:t>
-            </a:r>
-          </a:p>
-        </p:txBody>
-      </p:sp>
-    </p:spTree>
-    <p:extLst>
-      <p:ext uri="{BB962C8B-B14F-4D97-AF65-F5344CB8AC3E}">
-        <p14:creationId xmlns:p14="http://schemas.microsoft.com/office/powerpoint/2010/main" val="2547862235"/>
+        <p14:creationId xmlns:p14="http://schemas.microsoft.com/office/powerpoint/2010/main" val="2633423720"/>
       </p:ext>
     </p:extLst>
   </p:cSld>
@@ -13532,7 +14023,7 @@
           <p:cNvPr id="2" name="Title 1">
             <a:extLst>
               <a:ext uri="{FF2B5EF4-FFF2-40B4-BE49-F238E27FC236}">
-                <a16:creationId xmlns:a16="http://schemas.microsoft.com/office/drawing/2014/main" id="{37FEBBB6-F5E2-4465-9714-30BC8AD45BE5}"/>
+                <a16:creationId xmlns:a16="http://schemas.microsoft.com/office/drawing/2014/main" id="{B17F1AEA-475D-42AF-948E-43E970D9EC1B}"/>
               </a:ext>
             </a:extLst>
           </p:cNvPr>
@@ -13550,7 +14041,7 @@
           <a:p>
             <a:r>
               <a:rPr lang="en-US" dirty="0"/>
-              <a:t>Future Work</a:t>
+              <a:t>Project Structure</a:t>
             </a:r>
           </a:p>
         </p:txBody>
@@ -13560,7 +14051,7 @@
           <p:cNvPr id="3" name="Content Placeholder 2">
             <a:extLst>
               <a:ext uri="{FF2B5EF4-FFF2-40B4-BE49-F238E27FC236}">
-                <a16:creationId xmlns:a16="http://schemas.microsoft.com/office/drawing/2014/main" id="{9CC5868E-3491-4E89-B2DA-94BC70D4E090}"/>
+                <a16:creationId xmlns:a16="http://schemas.microsoft.com/office/drawing/2014/main" id="{BADEF35E-EDB9-4B1D-8EC4-086A1B8013DB}"/>
               </a:ext>
             </a:extLst>
           </p:cNvPr>
@@ -13577,6 +14068,298 @@
           <a:lstStyle/>
           <a:p>
             <a:endParaRPr lang="en-US"/>
+          </a:p>
+        </p:txBody>
+      </p:sp>
+      <p:sp>
+        <p:nvSpPr>
+          <p:cNvPr id="4" name="TextBox 3">
+            <a:extLst>
+              <a:ext uri="{FF2B5EF4-FFF2-40B4-BE49-F238E27FC236}">
+                <a16:creationId xmlns:a16="http://schemas.microsoft.com/office/drawing/2014/main" id="{B85C378E-F702-4DF5-8F8E-E9FB4FF7428C}"/>
+              </a:ext>
+            </a:extLst>
+          </p:cNvPr>
+          <p:cNvSpPr txBox="1"/>
+          <p:nvPr/>
+        </p:nvSpPr>
+        <p:spPr>
+          <a:xfrm>
+            <a:off x="2528514" y="2108468"/>
+            <a:ext cx="6909684" cy="3785652"/>
+          </a:xfrm>
+          <a:prstGeom prst="rect">
+            <a:avLst/>
+          </a:prstGeom>
+          <a:solidFill>
+            <a:schemeClr val="accent6">
+              <a:lumMod val="40000"/>
+              <a:lumOff val="60000"/>
+            </a:schemeClr>
+          </a:solidFill>
+        </p:spPr>
+        <p:txBody>
+          <a:bodyPr wrap="square" rtlCol="0">
+            <a:spAutoFit/>
+          </a:bodyPr>
+          <a:lstStyle/>
+          <a:p>
+            <a:r>
+              <a:rPr lang="en-US" sz="8000" dirty="0"/>
+              <a:t>Libby to add content from Readme?</a:t>
+            </a:r>
+          </a:p>
+        </p:txBody>
+      </p:sp>
+    </p:spTree>
+    <p:extLst>
+      <p:ext uri="{BB962C8B-B14F-4D97-AF65-F5344CB8AC3E}">
+        <p14:creationId xmlns:p14="http://schemas.microsoft.com/office/powerpoint/2010/main" val="1209367033"/>
+      </p:ext>
+    </p:extLst>
+  </p:cSld>
+  <p:clrMapOvr>
+    <a:masterClrMapping/>
+  </p:clrMapOvr>
+</p:sld>
+</file>
+
+<file path=ppt/slides/slide16.xml><?xml version="1.0" encoding="utf-8"?>
+<p:sld xmlns:a="http://schemas.openxmlformats.org/drawingml/2006/main" xmlns:r="http://schemas.openxmlformats.org/officeDocument/2006/relationships" xmlns:p="http://schemas.openxmlformats.org/presentationml/2006/main">
+  <p:cSld>
+    <p:spTree>
+      <p:nvGrpSpPr>
+        <p:cNvPr id="1" name=""/>
+        <p:cNvGrpSpPr/>
+        <p:nvPr/>
+      </p:nvGrpSpPr>
+      <p:grpSpPr>
+        <a:xfrm>
+          <a:off x="0" y="0"/>
+          <a:ext cx="0" cy="0"/>
+          <a:chOff x="0" y="0"/>
+          <a:chExt cx="0" cy="0"/>
+        </a:xfrm>
+      </p:grpSpPr>
+      <p:sp>
+        <p:nvSpPr>
+          <p:cNvPr id="2" name="Title 1">
+            <a:extLst>
+              <a:ext uri="{FF2B5EF4-FFF2-40B4-BE49-F238E27FC236}">
+                <a16:creationId xmlns:a16="http://schemas.microsoft.com/office/drawing/2014/main" id="{032B74C4-DBA1-4921-877B-2D81F3E48B4D}"/>
+              </a:ext>
+            </a:extLst>
+          </p:cNvPr>
+          <p:cNvSpPr>
+            <a:spLocks noGrp="1"/>
+          </p:cNvSpPr>
+          <p:nvPr>
+            <p:ph type="title"/>
+          </p:nvPr>
+        </p:nvSpPr>
+        <p:spPr/>
+        <p:txBody>
+          <a:bodyPr/>
+          <a:lstStyle/>
+          <a:p>
+            <a:r>
+              <a:rPr lang="en-US" dirty="0"/>
+              <a:t>Lessons Learned </a:t>
+            </a:r>
+          </a:p>
+        </p:txBody>
+      </p:sp>
+      <p:sp>
+        <p:nvSpPr>
+          <p:cNvPr id="3" name="Content Placeholder 2">
+            <a:extLst>
+              <a:ext uri="{FF2B5EF4-FFF2-40B4-BE49-F238E27FC236}">
+                <a16:creationId xmlns:a16="http://schemas.microsoft.com/office/drawing/2014/main" id="{92120D19-981E-4F1F-AB0E-F377E5C5FB01}"/>
+              </a:ext>
+            </a:extLst>
+          </p:cNvPr>
+          <p:cNvSpPr>
+            <a:spLocks noGrp="1"/>
+          </p:cNvSpPr>
+          <p:nvPr>
+            <p:ph idx="1"/>
+          </p:nvPr>
+        </p:nvSpPr>
+        <p:spPr/>
+        <p:txBody>
+          <a:bodyPr/>
+          <a:lstStyle/>
+          <a:p>
+            <a:r>
+              <a:rPr lang="en-US" dirty="0"/>
+              <a:t>Code mostly in notebook</a:t>
+            </a:r>
+          </a:p>
+          <a:p>
+            <a:r>
+              <a:rPr lang="en-US" dirty="0"/>
+              <a:t>Interactions of code - remembering to run the </a:t>
+            </a:r>
+            <a:r>
+              <a:rPr lang="en-US" dirty="0" err="1"/>
+              <a:t>unittests</a:t>
+            </a:r>
+            <a:r>
+              <a:rPr lang="en-US" dirty="0"/>
+              <a:t> </a:t>
+            </a:r>
+          </a:p>
+          <a:p>
+            <a:r>
+              <a:rPr lang="en-US" dirty="0"/>
+              <a:t>Try the code in multiple systems - discovered issue with </a:t>
+            </a:r>
+            <a:r>
+              <a:rPr lang="en-US" dirty="0" err="1"/>
+              <a:t>follium</a:t>
+            </a:r>
+            <a:r>
+              <a:rPr lang="en-US" dirty="0"/>
+              <a:t> (only works with </a:t>
+            </a:r>
+            <a:r>
+              <a:rPr lang="en-US" dirty="0" err="1"/>
+              <a:t>firefox</a:t>
+            </a:r>
+            <a:r>
+              <a:rPr lang="en-US" dirty="0"/>
+              <a:t>) </a:t>
+            </a:r>
+          </a:p>
+        </p:txBody>
+      </p:sp>
+      <p:sp>
+        <p:nvSpPr>
+          <p:cNvPr id="4" name="TextBox 3">
+            <a:extLst>
+              <a:ext uri="{FF2B5EF4-FFF2-40B4-BE49-F238E27FC236}">
+                <a16:creationId xmlns:a16="http://schemas.microsoft.com/office/drawing/2014/main" id="{41C664C5-F9E9-4F7E-AD36-B44F79DDDD99}"/>
+              </a:ext>
+            </a:extLst>
+          </p:cNvPr>
+          <p:cNvSpPr txBox="1"/>
+          <p:nvPr/>
+        </p:nvSpPr>
+        <p:spPr>
+          <a:xfrm>
+            <a:off x="2528514" y="2108468"/>
+            <a:ext cx="6909684" cy="2554545"/>
+          </a:xfrm>
+          <a:prstGeom prst="rect">
+            <a:avLst/>
+          </a:prstGeom>
+          <a:solidFill>
+            <a:schemeClr val="accent6">
+              <a:lumMod val="40000"/>
+              <a:lumOff val="60000"/>
+            </a:schemeClr>
+          </a:solidFill>
+        </p:spPr>
+        <p:txBody>
+          <a:bodyPr wrap="square" rtlCol="0">
+            <a:spAutoFit/>
+          </a:bodyPr>
+          <a:lstStyle/>
+          <a:p>
+            <a:r>
+              <a:rPr lang="en-US" sz="8000" dirty="0"/>
+              <a:t>Salik, Fei, Libby to add content</a:t>
+            </a:r>
+          </a:p>
+        </p:txBody>
+      </p:sp>
+    </p:spTree>
+    <p:extLst>
+      <p:ext uri="{BB962C8B-B14F-4D97-AF65-F5344CB8AC3E}">
+        <p14:creationId xmlns:p14="http://schemas.microsoft.com/office/powerpoint/2010/main" val="2547862235"/>
+      </p:ext>
+    </p:extLst>
+  </p:cSld>
+  <p:clrMapOvr>
+    <a:masterClrMapping/>
+  </p:clrMapOvr>
+</p:sld>
+</file>
+
+<file path=ppt/slides/slide17.xml><?xml version="1.0" encoding="utf-8"?>
+<p:sld xmlns:a="http://schemas.openxmlformats.org/drawingml/2006/main" xmlns:r="http://schemas.openxmlformats.org/officeDocument/2006/relationships" xmlns:p="http://schemas.openxmlformats.org/presentationml/2006/main">
+  <p:cSld>
+    <p:spTree>
+      <p:nvGrpSpPr>
+        <p:cNvPr id="1" name=""/>
+        <p:cNvGrpSpPr/>
+        <p:nvPr/>
+      </p:nvGrpSpPr>
+      <p:grpSpPr>
+        <a:xfrm>
+          <a:off x="0" y="0"/>
+          <a:ext cx="0" cy="0"/>
+          <a:chOff x="0" y="0"/>
+          <a:chExt cx="0" cy="0"/>
+        </a:xfrm>
+      </p:grpSpPr>
+      <p:sp>
+        <p:nvSpPr>
+          <p:cNvPr id="2" name="Title 1">
+            <a:extLst>
+              <a:ext uri="{FF2B5EF4-FFF2-40B4-BE49-F238E27FC236}">
+                <a16:creationId xmlns:a16="http://schemas.microsoft.com/office/drawing/2014/main" id="{37FEBBB6-F5E2-4465-9714-30BC8AD45BE5}"/>
+              </a:ext>
+            </a:extLst>
+          </p:cNvPr>
+          <p:cNvSpPr>
+            <a:spLocks noGrp="1"/>
+          </p:cNvSpPr>
+          <p:nvPr>
+            <p:ph type="title"/>
+          </p:nvPr>
+        </p:nvSpPr>
+        <p:spPr/>
+        <p:txBody>
+          <a:bodyPr/>
+          <a:lstStyle/>
+          <a:p>
+            <a:r>
+              <a:rPr lang="en-US" dirty="0"/>
+              <a:t>Future Work</a:t>
+            </a:r>
+          </a:p>
+        </p:txBody>
+      </p:sp>
+      <p:sp>
+        <p:nvSpPr>
+          <p:cNvPr id="3" name="Content Placeholder 2">
+            <a:extLst>
+              <a:ext uri="{FF2B5EF4-FFF2-40B4-BE49-F238E27FC236}">
+                <a16:creationId xmlns:a16="http://schemas.microsoft.com/office/drawing/2014/main" id="{9CC5868E-3491-4E89-B2DA-94BC70D4E090}"/>
+              </a:ext>
+            </a:extLst>
+          </p:cNvPr>
+          <p:cNvSpPr>
+            <a:spLocks noGrp="1"/>
+          </p:cNvSpPr>
+          <p:nvPr>
+            <p:ph idx="1"/>
+          </p:nvPr>
+        </p:nvSpPr>
+        <p:spPr/>
+        <p:txBody>
+          <a:bodyPr/>
+          <a:lstStyle/>
+          <a:p>
+            <a:r>
+              <a:rPr lang="en-US" dirty="0"/>
+              <a:t>Test for using </a:t>
+            </a:r>
+            <a:r>
+              <a:rPr lang="en-US"/>
+              <a:t>other cities’ data </a:t>
+            </a:r>
           </a:p>
         </p:txBody>
       </p:sp>
@@ -15351,6 +16134,14 @@
 <file path=ppt/slides/slide8.xml><?xml version="1.0" encoding="utf-8"?>
 <p:sld xmlns:a="http://schemas.openxmlformats.org/drawingml/2006/main" xmlns:r="http://schemas.openxmlformats.org/officeDocument/2006/relationships" xmlns:p="http://schemas.openxmlformats.org/presentationml/2006/main">
   <p:cSld>
+    <p:bg>
+      <p:bgPr>
+        <a:solidFill>
+          <a:schemeClr val="bg1"/>
+        </a:solidFill>
+        <a:effectLst/>
+      </p:bgPr>
+    </p:bg>
     <p:spTree>
       <p:nvGrpSpPr>
         <p:cNvPr id="1" name=""/>
@@ -15367,10 +16158,104 @@
       </p:grpSpPr>
       <p:sp>
         <p:nvSpPr>
+          <p:cNvPr id="14" name="Rectangle 9">
+            <a:extLst>
+              <a:ext uri="{FF2B5EF4-FFF2-40B4-BE49-F238E27FC236}">
+                <a16:creationId xmlns:a16="http://schemas.microsoft.com/office/drawing/2014/main" id="{867D4867-5BA7-4462-B2F6-A23F4A622AA7}"/>
+              </a:ext>
+              <a:ext uri="{C183D7F6-B498-43B3-948B-1728B52AA6E4}">
+                <adec:decorative xmlns:adec="http://schemas.microsoft.com/office/drawing/2017/decorative" val="1"/>
+              </a:ext>
+            </a:extLst>
+          </p:cNvPr>
+          <p:cNvSpPr>
+            <a:spLocks noGrp="1" noRot="1" noChangeAspect="1" noMove="1" noResize="1" noEditPoints="1" noAdjustHandles="1" noChangeArrowheads="1" noChangeShapeType="1" noTextEdit="1"/>
+          </p:cNvSpPr>
+          <p:nvPr>
+            <p:extLst>
+              <p:ext uri="{386F3935-93C4-4BCD-93E2-E3B085C9AB24}">
+                <p16:designElem xmlns:p16="http://schemas.microsoft.com/office/powerpoint/2015/main" val="1"/>
+              </p:ext>
+            </p:extLst>
+          </p:nvPr>
+        </p:nvSpPr>
+        <p:spPr>
+          <a:xfrm>
+            <a:off x="0" y="0"/>
+            <a:ext cx="4654296" cy="6858000"/>
+          </a:xfrm>
+          <a:prstGeom prst="rect">
+            <a:avLst/>
+          </a:prstGeom>
+          <a:solidFill>
+            <a:schemeClr val="tx1">
+              <a:lumMod val="75000"/>
+              <a:lumOff val="25000"/>
+            </a:schemeClr>
+          </a:solidFill>
+          <a:ln>
+            <a:noFill/>
+          </a:ln>
+        </p:spPr>
+        <p:style>
+          <a:lnRef idx="0">
+            <a:scrgbClr r="0" g="0" b="0"/>
+          </a:lnRef>
+          <a:fillRef idx="0">
+            <a:scrgbClr r="0" g="0" b="0"/>
+          </a:fillRef>
+          <a:effectRef idx="0">
+            <a:scrgbClr r="0" g="0" b="0"/>
+          </a:effectRef>
+          <a:fontRef idx="minor">
+            <a:schemeClr val="lt1"/>
+          </a:fontRef>
+        </p:style>
+        <p:txBody>
+          <a:bodyPr rtlCol="0" anchor="ctr"/>
+          <a:lstStyle/>
+          <a:p>
+            <a:pPr algn="ctr"/>
+            <a:endParaRPr lang="en-US"/>
+          </a:p>
+        </p:txBody>
+      </p:sp>
+      <p:pic>
+        <p:nvPicPr>
+          <p:cNvPr id="4" name="Picture 3">
+            <a:extLst>
+              <a:ext uri="{FF2B5EF4-FFF2-40B4-BE49-F238E27FC236}">
+                <a16:creationId xmlns:a16="http://schemas.microsoft.com/office/drawing/2014/main" id="{9CD1F9FE-1CDD-45F3-8601-F2710480B264}"/>
+              </a:ext>
+            </a:extLst>
+          </p:cNvPr>
+          <p:cNvPicPr>
+            <a:picLocks noChangeAspect="1"/>
+          </p:cNvPicPr>
+          <p:nvPr/>
+        </p:nvPicPr>
+        <p:blipFill>
+          <a:blip r:embed="rId3"/>
+          <a:stretch>
+            <a:fillRect/>
+          </a:stretch>
+        </p:blipFill>
+        <p:spPr>
+          <a:xfrm>
+            <a:off x="10400306" y="1"/>
+            <a:ext cx="1791693" cy="1007828"/>
+          </a:xfrm>
+          <a:prstGeom prst="rect">
+            <a:avLst/>
+          </a:prstGeom>
+        </p:spPr>
+      </p:pic>
+      <p:sp>
+        <p:nvSpPr>
           <p:cNvPr id="2" name="Title 1">
             <a:extLst>
               <a:ext uri="{FF2B5EF4-FFF2-40B4-BE49-F238E27FC236}">
-                <a16:creationId xmlns:a16="http://schemas.microsoft.com/office/drawing/2014/main" id="{508DDD15-CBD1-417D-82B1-B8D06DA18790}"/>
+                <a16:creationId xmlns:a16="http://schemas.microsoft.com/office/drawing/2014/main" id="{421649CD-C4DB-4A73-B411-9C060ECFEEA6}"/>
               </a:ext>
             </a:extLst>
           </p:cNvPr>
@@ -15381,15 +16266,38 @@
             <p:ph type="title"/>
           </p:nvPr>
         </p:nvSpPr>
-        <p:spPr/>
+        <p:spPr>
+          <a:xfrm>
+            <a:off x="643467" y="643467"/>
+            <a:ext cx="3363974" cy="1597315"/>
+          </a:xfrm>
+          <a:noFill/>
+          <a:ln w="19050">
+            <a:solidFill>
+              <a:schemeClr val="bg1"/>
+            </a:solidFill>
+          </a:ln>
+        </p:spPr>
         <p:txBody>
-          <a:bodyPr/>
+          <a:bodyPr wrap="square">
+            <a:normAutofit/>
+          </a:bodyPr>
           <a:lstStyle/>
           <a:p>
+            <a:pPr algn="ctr"/>
             <a:r>
-              <a:rPr lang="en-US" dirty="0"/>
-              <a:t>Demo: Visual – Over Time </a:t>
+              <a:rPr lang="en-US" sz="2800" b="1" dirty="0">
+                <a:solidFill>
+                  <a:schemeClr val="bg1"/>
+                </a:solidFill>
+              </a:rPr>
+              <a:t>Demo: Prepare Data</a:t>
             </a:r>
+            <a:endParaRPr lang="en-US" sz="2800" dirty="0">
+              <a:solidFill>
+                <a:schemeClr val="bg1"/>
+              </a:solidFill>
+            </a:endParaRPr>
           </a:p>
         </p:txBody>
       </p:sp>
@@ -15398,7 +16306,7 @@
           <p:cNvPr id="3" name="Content Placeholder 2">
             <a:extLst>
               <a:ext uri="{FF2B5EF4-FFF2-40B4-BE49-F238E27FC236}">
-                <a16:creationId xmlns:a16="http://schemas.microsoft.com/office/drawing/2014/main" id="{8BBB92C3-A3CD-4B02-88CD-5436522DA455}"/>
+                <a16:creationId xmlns:a16="http://schemas.microsoft.com/office/drawing/2014/main" id="{94ED32F1-C444-403D-9DB8-EDC87E620384}"/>
               </a:ext>
             </a:extLst>
           </p:cNvPr>
@@ -15409,59 +16317,120 @@
             <p:ph idx="1"/>
           </p:nvPr>
         </p:nvSpPr>
-        <p:spPr/>
+        <p:spPr>
+          <a:xfrm>
+            <a:off x="643468" y="2638044"/>
+            <a:ext cx="3363974" cy="3921376"/>
+          </a:xfrm>
+        </p:spPr>
         <p:txBody>
-          <a:bodyPr/>
+          <a:bodyPr>
+            <a:normAutofit/>
+          </a:bodyPr>
           <a:lstStyle/>
           <a:p>
-            <a:endParaRPr lang="en-US"/>
+            <a:r>
+              <a:rPr lang="en-US" sz="2000" dirty="0">
+                <a:solidFill>
+                  <a:schemeClr val="bg1"/>
+                </a:solidFill>
+              </a:rPr>
+              <a:t>Set of modules that creates a cleaned and integrated dataset. </a:t>
+            </a:r>
+          </a:p>
+          <a:p>
+            <a:endParaRPr lang="en-US" sz="2000" dirty="0">
+              <a:solidFill>
+                <a:schemeClr val="bg1"/>
+              </a:solidFill>
+            </a:endParaRPr>
+          </a:p>
+          <a:p>
+            <a:r>
+              <a:rPr lang="en-US" sz="2000" dirty="0">
+                <a:solidFill>
+                  <a:schemeClr val="bg1"/>
+                </a:solidFill>
+              </a:rPr>
+              <a:t>Example </a:t>
+            </a:r>
+            <a:r>
+              <a:rPr lang="en-US" sz="2000" dirty="0" err="1">
+                <a:solidFill>
+                  <a:schemeClr val="bg1"/>
+                </a:solidFill>
+              </a:rPr>
+              <a:t>jupyter</a:t>
+            </a:r>
+            <a:r>
+              <a:rPr lang="en-US" sz="2000" dirty="0">
+                <a:solidFill>
+                  <a:schemeClr val="bg1"/>
+                </a:solidFill>
+              </a:rPr>
+              <a:t> notebook walks the user through downloading the necessary data. </a:t>
+            </a:r>
+          </a:p>
+          <a:p>
+            <a:endParaRPr lang="en-US" sz="2000" dirty="0">
+              <a:solidFill>
+                <a:schemeClr val="bg1"/>
+              </a:solidFill>
+            </a:endParaRPr>
+          </a:p>
+          <a:p>
+            <a:r>
+              <a:rPr lang="en-US" sz="2000" dirty="0">
+                <a:solidFill>
+                  <a:schemeClr val="bg1"/>
+                </a:solidFill>
+              </a:rPr>
+              <a:t>Small subsets of data are on the repo and used for testing. </a:t>
+            </a:r>
+          </a:p>
+          <a:p>
+            <a:endParaRPr lang="en-US" sz="2000" dirty="0">
+              <a:solidFill>
+                <a:schemeClr val="bg1"/>
+              </a:solidFill>
+            </a:endParaRPr>
           </a:p>
         </p:txBody>
       </p:sp>
-      <p:sp>
-        <p:nvSpPr>
-          <p:cNvPr id="4" name="TextBox 3">
+      <p:pic>
+        <p:nvPicPr>
+          <p:cNvPr id="5" name="Picture 4">
             <a:extLst>
               <a:ext uri="{FF2B5EF4-FFF2-40B4-BE49-F238E27FC236}">
-                <a16:creationId xmlns:a16="http://schemas.microsoft.com/office/drawing/2014/main" id="{C42BEE23-9F3C-4C79-9AE3-0CF4FD98AEF8}"/>
+                <a16:creationId xmlns:a16="http://schemas.microsoft.com/office/drawing/2014/main" id="{D09C52BA-7E26-4E85-9D93-08A8F86C8015}"/>
               </a:ext>
             </a:extLst>
           </p:cNvPr>
-          <p:cNvSpPr txBox="1"/>
+          <p:cNvPicPr>
+            <a:picLocks noChangeAspect="1"/>
+          </p:cNvPicPr>
           <p:nvPr/>
-        </p:nvSpPr>
+        </p:nvPicPr>
+        <p:blipFill>
+          <a:blip r:embed="rId4"/>
+          <a:stretch>
+            <a:fillRect/>
+          </a:stretch>
+        </p:blipFill>
         <p:spPr>
           <a:xfrm>
-            <a:off x="2512612" y="1027906"/>
-            <a:ext cx="6909684" cy="5401479"/>
+            <a:off x="5026562" y="1007829"/>
+            <a:ext cx="5373744" cy="5761469"/>
           </a:xfrm>
           <a:prstGeom prst="rect">
             <a:avLst/>
           </a:prstGeom>
-          <a:solidFill>
-            <a:schemeClr val="accent6">
-              <a:lumMod val="40000"/>
-              <a:lumOff val="60000"/>
-            </a:schemeClr>
-          </a:solidFill>
         </p:spPr>
-        <p:txBody>
-          <a:bodyPr wrap="square" rtlCol="0">
-            <a:spAutoFit/>
-          </a:bodyPr>
-          <a:lstStyle/>
-          <a:p>
-            <a:r>
-              <a:rPr lang="en-US" sz="11500" dirty="0"/>
-              <a:t>Salik/Fei to add content</a:t>
-            </a:r>
-          </a:p>
-        </p:txBody>
-      </p:sp>
+      </p:pic>
     </p:spTree>
     <p:extLst>
       <p:ext uri="{BB962C8B-B14F-4D97-AF65-F5344CB8AC3E}">
-        <p14:creationId xmlns:p14="http://schemas.microsoft.com/office/powerpoint/2010/main" val="4265778210"/>
+        <p14:creationId xmlns:p14="http://schemas.microsoft.com/office/powerpoint/2010/main" val="24930013"/>
       </p:ext>
     </p:extLst>
   </p:cSld>
@@ -15493,7 +16462,7 @@
           <p:cNvPr id="2" name="Title 1">
             <a:extLst>
               <a:ext uri="{FF2B5EF4-FFF2-40B4-BE49-F238E27FC236}">
-                <a16:creationId xmlns:a16="http://schemas.microsoft.com/office/drawing/2014/main" id="{8233DF18-E03C-49D1-B240-F0291BAA88B6}"/>
+                <a16:creationId xmlns:a16="http://schemas.microsoft.com/office/drawing/2014/main" id="{508DDD15-CBD1-417D-82B1-B8D06DA18790}"/>
               </a:ext>
             </a:extLst>
           </p:cNvPr>
@@ -15511,7 +16480,7 @@
           <a:p>
             <a:r>
               <a:rPr lang="en-US" dirty="0"/>
-              <a:t>Demo: Visual – Neighborhoods </a:t>
+              <a:t>Demo: Visual – Over Time </a:t>
             </a:r>
           </a:p>
         </p:txBody>
@@ -15521,7 +16490,7 @@
           <p:cNvPr id="3" name="Content Placeholder 2">
             <a:extLst>
               <a:ext uri="{FF2B5EF4-FFF2-40B4-BE49-F238E27FC236}">
-                <a16:creationId xmlns:a16="http://schemas.microsoft.com/office/drawing/2014/main" id="{A637F01D-46D8-4E48-AC30-91B39E3F2351}"/>
+                <a16:creationId xmlns:a16="http://schemas.microsoft.com/office/drawing/2014/main" id="{8BBB92C3-A3CD-4B02-88CD-5436522DA455}"/>
               </a:ext>
             </a:extLst>
           </p:cNvPr>
@@ -15546,7 +16515,7 @@
           <p:cNvPr id="4" name="TextBox 3">
             <a:extLst>
               <a:ext uri="{FF2B5EF4-FFF2-40B4-BE49-F238E27FC236}">
-                <a16:creationId xmlns:a16="http://schemas.microsoft.com/office/drawing/2014/main" id="{888FDCD5-9522-4DA4-8A03-845A7E208D22}"/>
+                <a16:creationId xmlns:a16="http://schemas.microsoft.com/office/drawing/2014/main" id="{C42BEE23-9F3C-4C79-9AE3-0CF4FD98AEF8}"/>
               </a:ext>
             </a:extLst>
           </p:cNvPr>
@@ -15576,7 +16545,7 @@
           <a:p>
             <a:r>
               <a:rPr lang="en-US" sz="11500" dirty="0"/>
-              <a:t>Libby to add content</a:t>
+              <a:t>Salik/Fei to add content</a:t>
             </a:r>
           </a:p>
         </p:txBody>
@@ -15584,7 +16553,7 @@
     </p:spTree>
     <p:extLst>
       <p:ext uri="{BB962C8B-B14F-4D97-AF65-F5344CB8AC3E}">
-        <p14:creationId xmlns:p14="http://schemas.microsoft.com/office/powerpoint/2010/main" val="1007286814"/>
+        <p14:creationId xmlns:p14="http://schemas.microsoft.com/office/powerpoint/2010/main" val="4265778210"/>
       </p:ext>
     </p:extLst>
   </p:cSld>

</xml_diff>

<commit_message>
Adding presentation to the doc
</commit_message>
<xml_diff>
--- a/doc/wa_collisions_final_presentation.pptx
+++ b/doc/wa_collisions_final_presentation.pptx
@@ -128,1009 +128,6 @@
     </p:ext>
   </p:extLst>
 </p:presentation>
-</file>
-
-<file path=ppt/revisionInfo.xml><?xml version="1.0" encoding="utf-8"?>
-<p1510:revInfo xmlns:a="http://schemas.openxmlformats.org/drawingml/2006/main" xmlns:r="http://schemas.openxmlformats.org/officeDocument/2006/relationships" xmlns:p1510="http://schemas.microsoft.com/office/powerpoint/2015/10/main">
-  <p1510:revLst>
-    <p1510:client id="{7D15DF69-8A33-4A5F-A95C-BD15408E3D01}" v="4052" dt="2018-06-02T20:40:30.670"/>
-  </p1510:revLst>
-</p1510:revInfo>
-</file>
-
-<file path=ppt/changesInfos/changesInfo1.xml><?xml version="1.0" encoding="utf-8"?>
-<pc:chgInfo xmlns:a="http://schemas.openxmlformats.org/drawingml/2006/main" xmlns:r="http://schemas.openxmlformats.org/officeDocument/2006/relationships" xmlns:ac="http://schemas.microsoft.com/office/drawing/2013/main/command" xmlns:pc="http://schemas.microsoft.com/office/powerpoint/2013/main/command">
-  <pc:docChgLst>
-    <pc:chgData name="Geoff Coyner" userId="c41f8547ae985f2b" providerId="LiveId" clId="{7D15DF69-8A33-4A5F-A95C-BD15408E3D01}"/>
-    <pc:docChg chg="undo custSel mod addSld delSld modSld sldOrd">
-      <pc:chgData name="Geoff Coyner" userId="c41f8547ae985f2b" providerId="LiveId" clId="{7D15DF69-8A33-4A5F-A95C-BD15408E3D01}" dt="2018-06-02T20:40:30.669" v="4027"/>
-      <pc:docMkLst>
-        <pc:docMk/>
-      </pc:docMkLst>
-      <pc:sldChg chg="addSp delSp modSp add del mod ord setBg">
-        <pc:chgData name="Geoff Coyner" userId="c41f8547ae985f2b" providerId="LiveId" clId="{7D15DF69-8A33-4A5F-A95C-BD15408E3D01}" dt="2018-06-02T20:18:08.302" v="3673" actId="6549"/>
-        <pc:sldMkLst>
-          <pc:docMk/>
-          <pc:sldMk cId="2394819103" sldId="256"/>
-        </pc:sldMkLst>
-        <pc:spChg chg="mod ord">
-          <ac:chgData name="Geoff Coyner" userId="c41f8547ae985f2b" providerId="LiveId" clId="{7D15DF69-8A33-4A5F-A95C-BD15408E3D01}" dt="2018-06-02T20:18:08.302" v="3673" actId="6549"/>
-          <ac:spMkLst>
-            <pc:docMk/>
-            <pc:sldMk cId="2394819103" sldId="256"/>
-            <ac:spMk id="4" creationId="{3C0B0A9A-2705-4AA3-9255-5BD4A8B31D95}"/>
-          </ac:spMkLst>
-        </pc:spChg>
-        <pc:spChg chg="del">
-          <ac:chgData name="Geoff Coyner" userId="c41f8547ae985f2b" providerId="LiveId" clId="{7D15DF69-8A33-4A5F-A95C-BD15408E3D01}" dt="2018-06-02T20:16:19.415" v="3644" actId="26606"/>
-          <ac:spMkLst>
-            <pc:docMk/>
-            <pc:sldMk cId="2394819103" sldId="256"/>
-            <ac:spMk id="5" creationId="{B4EDDEBC-0B60-4E89-A8C1-3CFC2F1D8AA6}"/>
-          </ac:spMkLst>
-        </pc:spChg>
-        <pc:spChg chg="add">
-          <ac:chgData name="Geoff Coyner" userId="c41f8547ae985f2b" providerId="LiveId" clId="{7D15DF69-8A33-4A5F-A95C-BD15408E3D01}" dt="2018-06-02T20:16:19.415" v="3644" actId="26606"/>
-          <ac:spMkLst>
-            <pc:docMk/>
-            <pc:sldMk cId="2394819103" sldId="256"/>
-            <ac:spMk id="13" creationId="{BE95D989-81FA-4BAD-9AD5-E46CEDA91B36}"/>
-          </ac:spMkLst>
-        </pc:spChg>
-        <pc:spChg chg="add">
-          <ac:chgData name="Geoff Coyner" userId="c41f8547ae985f2b" providerId="LiveId" clId="{7D15DF69-8A33-4A5F-A95C-BD15408E3D01}" dt="2018-06-02T20:16:19.415" v="3644" actId="26606"/>
-          <ac:spMkLst>
-            <pc:docMk/>
-            <pc:sldMk cId="2394819103" sldId="256"/>
-            <ac:spMk id="15" creationId="{156189E5-8A3E-4CFD-B71B-CCD0F8495E56}"/>
-          </ac:spMkLst>
-        </pc:spChg>
-        <pc:graphicFrameChg chg="add mod">
-          <ac:chgData name="Geoff Coyner" userId="c41f8547ae985f2b" providerId="LiveId" clId="{7D15DF69-8A33-4A5F-A95C-BD15408E3D01}" dt="2018-06-02T20:16:44.314" v="3651" actId="1076"/>
-          <ac:graphicFrameMkLst>
-            <pc:docMk/>
-            <pc:sldMk cId="2394819103" sldId="256"/>
-            <ac:graphicFrameMk id="8" creationId="{E17E82B7-0C2B-447D-BB4B-58D6E3C7D904}"/>
-          </ac:graphicFrameMkLst>
-        </pc:graphicFrameChg>
-        <pc:picChg chg="add">
-          <ac:chgData name="Geoff Coyner" userId="c41f8547ae985f2b" providerId="LiveId" clId="{7D15DF69-8A33-4A5F-A95C-BD15408E3D01}" dt="2018-06-02T20:15:50.408" v="3643" actId="6549"/>
-          <ac:picMkLst>
-            <pc:docMk/>
-            <pc:sldMk cId="2394819103" sldId="256"/>
-            <ac:picMk id="6" creationId="{FE21C0BD-EDAC-4161-B23F-E09EA92C0C55}"/>
-          </ac:picMkLst>
-        </pc:picChg>
-      </pc:sldChg>
-      <pc:sldChg chg="addSp delSp modSp">
-        <pc:chgData name="Geoff Coyner" userId="c41f8547ae985f2b" providerId="LiveId" clId="{7D15DF69-8A33-4A5F-A95C-BD15408E3D01}" dt="2018-06-02T19:04:00.018" v="95" actId="20577"/>
-        <pc:sldMkLst>
-          <pc:docMk/>
-          <pc:sldMk cId="1999758261" sldId="258"/>
-        </pc:sldMkLst>
-        <pc:spChg chg="mod">
-          <ac:chgData name="Geoff Coyner" userId="c41f8547ae985f2b" providerId="LiveId" clId="{7D15DF69-8A33-4A5F-A95C-BD15408E3D01}" dt="2018-06-02T19:02:01.536" v="33" actId="20577"/>
-          <ac:spMkLst>
-            <pc:docMk/>
-            <pc:sldMk cId="1999758261" sldId="258"/>
-            <ac:spMk id="2" creationId="{2F450CAF-4AA3-4412-A91D-B5C97DA9EB9F}"/>
-          </ac:spMkLst>
-        </pc:spChg>
-        <pc:spChg chg="mod">
-          <ac:chgData name="Geoff Coyner" userId="c41f8547ae985f2b" providerId="LiveId" clId="{7D15DF69-8A33-4A5F-A95C-BD15408E3D01}" dt="2018-06-02T19:04:00.018" v="95" actId="20577"/>
-          <ac:spMkLst>
-            <pc:docMk/>
-            <pc:sldMk cId="1999758261" sldId="258"/>
-            <ac:spMk id="3" creationId="{9995E7BD-AAA2-4611-AF6E-F0180A581F6F}"/>
-          </ac:spMkLst>
-        </pc:spChg>
-        <pc:picChg chg="add mod">
-          <ac:chgData name="Geoff Coyner" userId="c41f8547ae985f2b" providerId="LiveId" clId="{7D15DF69-8A33-4A5F-A95C-BD15408E3D01}" dt="2018-06-02T19:01:47.133" v="4" actId="1076"/>
-          <ac:picMkLst>
-            <pc:docMk/>
-            <pc:sldMk cId="1999758261" sldId="258"/>
-            <ac:picMk id="4" creationId="{EE52AE24-356A-4B4C-BD2D-221D36DBB113}"/>
-          </ac:picMkLst>
-        </pc:picChg>
-        <pc:picChg chg="del mod">
-          <ac:chgData name="Geoff Coyner" userId="c41f8547ae985f2b" providerId="LiveId" clId="{7D15DF69-8A33-4A5F-A95C-BD15408E3D01}" dt="2018-06-02T19:01:32.734" v="1" actId="478"/>
-          <ac:picMkLst>
-            <pc:docMk/>
-            <pc:sldMk cId="1999758261" sldId="258"/>
-            <ac:picMk id="1026" creationId="{8CC63E40-D8AA-4FE6-B751-002DBBDE8095}"/>
-          </ac:picMkLst>
-        </pc:picChg>
-      </pc:sldChg>
-      <pc:sldChg chg="addSp delSp modSp del">
-        <pc:chgData name="Geoff Coyner" userId="c41f8547ae985f2b" providerId="LiveId" clId="{7D15DF69-8A33-4A5F-A95C-BD15408E3D01}" dt="2018-06-02T20:39:34.404" v="3990" actId="47"/>
-        <pc:sldMkLst>
-          <pc:docMk/>
-          <pc:sldMk cId="1822275178" sldId="269"/>
-        </pc:sldMkLst>
-        <pc:spChg chg="mod">
-          <ac:chgData name="Geoff Coyner" userId="c41f8547ae985f2b" providerId="LiveId" clId="{7D15DF69-8A33-4A5F-A95C-BD15408E3D01}" dt="2018-06-02T20:37:18.867" v="3962" actId="164"/>
-          <ac:spMkLst>
-            <pc:docMk/>
-            <pc:sldMk cId="1822275178" sldId="269"/>
-            <ac:spMk id="4" creationId="{873F74BE-0B09-4B6A-AEBD-0836E161048A}"/>
-          </ac:spMkLst>
-        </pc:spChg>
-        <pc:spChg chg="mod">
-          <ac:chgData name="Geoff Coyner" userId="c41f8547ae985f2b" providerId="LiveId" clId="{7D15DF69-8A33-4A5F-A95C-BD15408E3D01}" dt="2018-06-02T20:37:18.867" v="3962" actId="164"/>
-          <ac:spMkLst>
-            <pc:docMk/>
-            <pc:sldMk cId="1822275178" sldId="269"/>
-            <ac:spMk id="6" creationId="{EDC4D4DB-47DF-4C56-BE07-08216E3C7E55}"/>
-          </ac:spMkLst>
-        </pc:spChg>
-        <pc:spChg chg="mod">
-          <ac:chgData name="Geoff Coyner" userId="c41f8547ae985f2b" providerId="LiveId" clId="{7D15DF69-8A33-4A5F-A95C-BD15408E3D01}" dt="2018-06-02T20:37:18.867" v="3962" actId="164"/>
-          <ac:spMkLst>
-            <pc:docMk/>
-            <pc:sldMk cId="1822275178" sldId="269"/>
-            <ac:spMk id="7" creationId="{1D56C445-3BAC-42BD-9DC6-3424A5415B99}"/>
-          </ac:spMkLst>
-        </pc:spChg>
-        <pc:spChg chg="mod">
-          <ac:chgData name="Geoff Coyner" userId="c41f8547ae985f2b" providerId="LiveId" clId="{7D15DF69-8A33-4A5F-A95C-BD15408E3D01}" dt="2018-06-02T20:37:18.867" v="3962" actId="164"/>
-          <ac:spMkLst>
-            <pc:docMk/>
-            <pc:sldMk cId="1822275178" sldId="269"/>
-            <ac:spMk id="8" creationId="{4DC5832C-AEB7-4CBE-8C20-34209BE1649C}"/>
-          </ac:spMkLst>
-        </pc:spChg>
-        <pc:spChg chg="mod">
-          <ac:chgData name="Geoff Coyner" userId="c41f8547ae985f2b" providerId="LiveId" clId="{7D15DF69-8A33-4A5F-A95C-BD15408E3D01}" dt="2018-06-02T20:37:18.867" v="3962" actId="164"/>
-          <ac:spMkLst>
-            <pc:docMk/>
-            <pc:sldMk cId="1822275178" sldId="269"/>
-            <ac:spMk id="10" creationId="{F009073E-ADB6-4C0D-9157-912D2FAD498F}"/>
-          </ac:spMkLst>
-        </pc:spChg>
-        <pc:spChg chg="mod">
-          <ac:chgData name="Geoff Coyner" userId="c41f8547ae985f2b" providerId="LiveId" clId="{7D15DF69-8A33-4A5F-A95C-BD15408E3D01}" dt="2018-06-02T20:37:18.867" v="3962" actId="164"/>
-          <ac:spMkLst>
-            <pc:docMk/>
-            <pc:sldMk cId="1822275178" sldId="269"/>
-            <ac:spMk id="11" creationId="{B91DD621-9C28-416B-B45B-CE8A6AB97ADF}"/>
-          </ac:spMkLst>
-        </pc:spChg>
-        <pc:spChg chg="mod">
-          <ac:chgData name="Geoff Coyner" userId="c41f8547ae985f2b" providerId="LiveId" clId="{7D15DF69-8A33-4A5F-A95C-BD15408E3D01}" dt="2018-06-02T20:37:18.867" v="3962" actId="164"/>
-          <ac:spMkLst>
-            <pc:docMk/>
-            <pc:sldMk cId="1822275178" sldId="269"/>
-            <ac:spMk id="12" creationId="{D4ACC452-725C-487C-86B5-ECCFDF241F68}"/>
-          </ac:spMkLst>
-        </pc:spChg>
-        <pc:spChg chg="mod">
-          <ac:chgData name="Geoff Coyner" userId="c41f8547ae985f2b" providerId="LiveId" clId="{7D15DF69-8A33-4A5F-A95C-BD15408E3D01}" dt="2018-06-02T20:37:18.867" v="3962" actId="164"/>
-          <ac:spMkLst>
-            <pc:docMk/>
-            <pc:sldMk cId="1822275178" sldId="269"/>
-            <ac:spMk id="13" creationId="{4542E26A-D688-47E6-B8C3-5C29B13A7985}"/>
-          </ac:spMkLst>
-        </pc:spChg>
-        <pc:spChg chg="mod">
-          <ac:chgData name="Geoff Coyner" userId="c41f8547ae985f2b" providerId="LiveId" clId="{7D15DF69-8A33-4A5F-A95C-BD15408E3D01}" dt="2018-06-02T20:37:18.867" v="3962" actId="164"/>
-          <ac:spMkLst>
-            <pc:docMk/>
-            <pc:sldMk cId="1822275178" sldId="269"/>
-            <ac:spMk id="14" creationId="{8912B274-7231-4305-96E8-72B93640ED05}"/>
-          </ac:spMkLst>
-        </pc:spChg>
-        <pc:spChg chg="mod">
-          <ac:chgData name="Geoff Coyner" userId="c41f8547ae985f2b" providerId="LiveId" clId="{7D15DF69-8A33-4A5F-A95C-BD15408E3D01}" dt="2018-06-02T20:37:18.867" v="3962" actId="164"/>
-          <ac:spMkLst>
-            <pc:docMk/>
-            <pc:sldMk cId="1822275178" sldId="269"/>
-            <ac:spMk id="15" creationId="{373B738F-3D95-428E-A052-C21A38E489CE}"/>
-          </ac:spMkLst>
-        </pc:spChg>
-        <pc:spChg chg="mod">
-          <ac:chgData name="Geoff Coyner" userId="c41f8547ae985f2b" providerId="LiveId" clId="{7D15DF69-8A33-4A5F-A95C-BD15408E3D01}" dt="2018-06-02T20:37:18.867" v="3962" actId="164"/>
-          <ac:spMkLst>
-            <pc:docMk/>
-            <pc:sldMk cId="1822275178" sldId="269"/>
-            <ac:spMk id="16" creationId="{D0B9D4AD-6EA4-4D38-B381-335FB6F2946D}"/>
-          </ac:spMkLst>
-        </pc:spChg>
-        <pc:spChg chg="mod">
-          <ac:chgData name="Geoff Coyner" userId="c41f8547ae985f2b" providerId="LiveId" clId="{7D15DF69-8A33-4A5F-A95C-BD15408E3D01}" dt="2018-06-02T20:37:18.867" v="3962" actId="164"/>
-          <ac:spMkLst>
-            <pc:docMk/>
-            <pc:sldMk cId="1822275178" sldId="269"/>
-            <ac:spMk id="17" creationId="{12128019-F5A2-48D2-B9A0-0A6A66B40F0F}"/>
-          </ac:spMkLst>
-        </pc:spChg>
-        <pc:spChg chg="mod">
-          <ac:chgData name="Geoff Coyner" userId="c41f8547ae985f2b" providerId="LiveId" clId="{7D15DF69-8A33-4A5F-A95C-BD15408E3D01}" dt="2018-06-02T20:37:18.867" v="3962" actId="164"/>
-          <ac:spMkLst>
-            <pc:docMk/>
-            <pc:sldMk cId="1822275178" sldId="269"/>
-            <ac:spMk id="18" creationId="{0F9D24E3-39AC-44A5-97EC-691374790A2A}"/>
-          </ac:spMkLst>
-        </pc:spChg>
-        <pc:spChg chg="mod">
-          <ac:chgData name="Geoff Coyner" userId="c41f8547ae985f2b" providerId="LiveId" clId="{7D15DF69-8A33-4A5F-A95C-BD15408E3D01}" dt="2018-06-02T20:37:18.867" v="3962" actId="164"/>
-          <ac:spMkLst>
-            <pc:docMk/>
-            <pc:sldMk cId="1822275178" sldId="269"/>
-            <ac:spMk id="19" creationId="{18E21394-3069-416A-824C-154EF12F2440}"/>
-          </ac:spMkLst>
-        </pc:spChg>
-        <pc:spChg chg="mod">
-          <ac:chgData name="Geoff Coyner" userId="c41f8547ae985f2b" providerId="LiveId" clId="{7D15DF69-8A33-4A5F-A95C-BD15408E3D01}" dt="2018-06-02T20:37:18.867" v="3962" actId="164"/>
-          <ac:spMkLst>
-            <pc:docMk/>
-            <pc:sldMk cId="1822275178" sldId="269"/>
-            <ac:spMk id="20" creationId="{9D338FD9-5FCD-48A2-BC34-893A0FFD3F7B}"/>
-          </ac:spMkLst>
-        </pc:spChg>
-        <pc:spChg chg="mod">
-          <ac:chgData name="Geoff Coyner" userId="c41f8547ae985f2b" providerId="LiveId" clId="{7D15DF69-8A33-4A5F-A95C-BD15408E3D01}" dt="2018-06-02T20:37:18.867" v="3962" actId="164"/>
-          <ac:spMkLst>
-            <pc:docMk/>
-            <pc:sldMk cId="1822275178" sldId="269"/>
-            <ac:spMk id="21" creationId="{1C263E52-ED69-4572-B857-76E562A89534}"/>
-          </ac:spMkLst>
-        </pc:spChg>
-        <pc:spChg chg="mod">
-          <ac:chgData name="Geoff Coyner" userId="c41f8547ae985f2b" providerId="LiveId" clId="{7D15DF69-8A33-4A5F-A95C-BD15408E3D01}" dt="2018-06-02T20:37:18.867" v="3962" actId="164"/>
-          <ac:spMkLst>
-            <pc:docMk/>
-            <pc:sldMk cId="1822275178" sldId="269"/>
-            <ac:spMk id="22" creationId="{D533A1E7-B525-44A5-A1FF-2D754878E95D}"/>
-          </ac:spMkLst>
-        </pc:spChg>
-        <pc:spChg chg="mod">
-          <ac:chgData name="Geoff Coyner" userId="c41f8547ae985f2b" providerId="LiveId" clId="{7D15DF69-8A33-4A5F-A95C-BD15408E3D01}" dt="2018-06-02T20:37:18.867" v="3962" actId="164"/>
-          <ac:spMkLst>
-            <pc:docMk/>
-            <pc:sldMk cId="1822275178" sldId="269"/>
-            <ac:spMk id="23" creationId="{703CC826-9EED-4561-86DD-CED07B392E17}"/>
-          </ac:spMkLst>
-        </pc:spChg>
-        <pc:spChg chg="mod">
-          <ac:chgData name="Geoff Coyner" userId="c41f8547ae985f2b" providerId="LiveId" clId="{7D15DF69-8A33-4A5F-A95C-BD15408E3D01}" dt="2018-06-02T20:37:18.867" v="3962" actId="164"/>
-          <ac:spMkLst>
-            <pc:docMk/>
-            <pc:sldMk cId="1822275178" sldId="269"/>
-            <ac:spMk id="24" creationId="{72A4C903-B79D-4E56-8C1E-0E927EBEB86C}"/>
-          </ac:spMkLst>
-        </pc:spChg>
-        <pc:spChg chg="mod">
-          <ac:chgData name="Geoff Coyner" userId="c41f8547ae985f2b" providerId="LiveId" clId="{7D15DF69-8A33-4A5F-A95C-BD15408E3D01}" dt="2018-06-02T20:37:18.867" v="3962" actId="164"/>
-          <ac:spMkLst>
-            <pc:docMk/>
-            <pc:sldMk cId="1822275178" sldId="269"/>
-            <ac:spMk id="25" creationId="{C5DC69D7-E7E5-43A1-B516-1EDBA25D5DD3}"/>
-          </ac:spMkLst>
-        </pc:spChg>
-        <pc:spChg chg="del mod">
-          <ac:chgData name="Geoff Coyner" userId="c41f8547ae985f2b" providerId="LiveId" clId="{7D15DF69-8A33-4A5F-A95C-BD15408E3D01}" dt="2018-06-02T20:37:11.927" v="3961" actId="478"/>
-          <ac:spMkLst>
-            <pc:docMk/>
-            <pc:sldMk cId="1822275178" sldId="269"/>
-            <ac:spMk id="26" creationId="{BB665177-EF4D-4FD8-8F2D-8FC8F0E7DA49}"/>
-          </ac:spMkLst>
-        </pc:spChg>
-        <pc:grpChg chg="add mod">
-          <ac:chgData name="Geoff Coyner" userId="c41f8547ae985f2b" providerId="LiveId" clId="{7D15DF69-8A33-4A5F-A95C-BD15408E3D01}" dt="2018-06-02T20:37:18.867" v="3962" actId="164"/>
-          <ac:grpSpMkLst>
-            <pc:docMk/>
-            <pc:sldMk cId="1822275178" sldId="269"/>
-            <ac:grpSpMk id="2" creationId="{21CA116E-56DB-4E67-B639-11FEB79A9693}"/>
-          </ac:grpSpMkLst>
-        </pc:grpChg>
-      </pc:sldChg>
-      <pc:sldChg chg="addSp delSp modSp mod setBg modNotesTx">
-        <pc:chgData name="Geoff Coyner" userId="c41f8547ae985f2b" providerId="LiveId" clId="{7D15DF69-8A33-4A5F-A95C-BD15408E3D01}" dt="2018-06-02T19:39:36.641" v="1809" actId="20577"/>
-        <pc:sldMkLst>
-          <pc:docMk/>
-          <pc:sldMk cId="59155075" sldId="270"/>
-        </pc:sldMkLst>
-        <pc:spChg chg="mod">
-          <ac:chgData name="Geoff Coyner" userId="c41f8547ae985f2b" providerId="LiveId" clId="{7D15DF69-8A33-4A5F-A95C-BD15408E3D01}" dt="2018-06-02T19:38:45.554" v="1764" actId="20577"/>
-          <ac:spMkLst>
-            <pc:docMk/>
-            <pc:sldMk cId="59155075" sldId="270"/>
-            <ac:spMk id="2" creationId="{421649CD-C4DB-4A73-B411-9C060ECFEEA6}"/>
-          </ac:spMkLst>
-        </pc:spChg>
-        <pc:spChg chg="mod">
-          <ac:chgData name="Geoff Coyner" userId="c41f8547ae985f2b" providerId="LiveId" clId="{7D15DF69-8A33-4A5F-A95C-BD15408E3D01}" dt="2018-06-02T19:38:32.653" v="1754" actId="26606"/>
-          <ac:spMkLst>
-            <pc:docMk/>
-            <pc:sldMk cId="59155075" sldId="270"/>
-            <ac:spMk id="3" creationId="{94ED32F1-C444-403D-9DB8-EDC87E620384}"/>
-          </ac:spMkLst>
-        </pc:spChg>
-        <pc:spChg chg="add del">
-          <ac:chgData name="Geoff Coyner" userId="c41f8547ae985f2b" providerId="LiveId" clId="{7D15DF69-8A33-4A5F-A95C-BD15408E3D01}" dt="2018-06-02T19:38:32.618" v="1753" actId="26606"/>
-          <ac:spMkLst>
-            <pc:docMk/>
-            <pc:sldMk cId="59155075" sldId="270"/>
-            <ac:spMk id="10" creationId="{4038CB10-1F5C-4D54-9DF7-12586DE5B007}"/>
-          </ac:spMkLst>
-        </pc:spChg>
-        <pc:spChg chg="add del">
-          <ac:chgData name="Geoff Coyner" userId="c41f8547ae985f2b" providerId="LiveId" clId="{7D15DF69-8A33-4A5F-A95C-BD15408E3D01}" dt="2018-06-02T19:38:32.618" v="1753" actId="26606"/>
-          <ac:spMkLst>
-            <pc:docMk/>
-            <pc:sldMk cId="59155075" sldId="270"/>
-            <ac:spMk id="12" creationId="{73ED6512-6858-4552-B699-9A97FE9A4EA2}"/>
-          </ac:spMkLst>
-        </pc:spChg>
-        <pc:spChg chg="add">
-          <ac:chgData name="Geoff Coyner" userId="c41f8547ae985f2b" providerId="LiveId" clId="{7D15DF69-8A33-4A5F-A95C-BD15408E3D01}" dt="2018-06-02T19:38:32.653" v="1754" actId="26606"/>
-          <ac:spMkLst>
-            <pc:docMk/>
-            <pc:sldMk cId="59155075" sldId="270"/>
-            <ac:spMk id="14" creationId="{867D4867-5BA7-4462-B2F6-A23F4A622AA7}"/>
-          </ac:spMkLst>
-        </pc:spChg>
-        <pc:picChg chg="add ord">
-          <ac:chgData name="Geoff Coyner" userId="c41f8547ae985f2b" providerId="LiveId" clId="{7D15DF69-8A33-4A5F-A95C-BD15408E3D01}" dt="2018-06-02T19:38:32.653" v="1754" actId="26606"/>
-          <ac:picMkLst>
-            <pc:docMk/>
-            <pc:sldMk cId="59155075" sldId="270"/>
-            <ac:picMk id="4" creationId="{9CD1F9FE-1CDD-45F3-8601-F2710480B264}"/>
-          </ac:picMkLst>
-        </pc:picChg>
-        <pc:picChg chg="add mod ord">
-          <ac:chgData name="Geoff Coyner" userId="c41f8547ae985f2b" providerId="LiveId" clId="{7D15DF69-8A33-4A5F-A95C-BD15408E3D01}" dt="2018-06-02T19:38:32.653" v="1754" actId="26606"/>
-          <ac:picMkLst>
-            <pc:docMk/>
-            <pc:sldMk cId="59155075" sldId="270"/>
-            <ac:picMk id="5" creationId="{32E613B2-EB9C-49DC-9974-0600DFD62A33}"/>
-          </ac:picMkLst>
-        </pc:picChg>
-      </pc:sldChg>
-      <pc:sldChg chg="addSp modSp">
-        <pc:chgData name="Geoff Coyner" userId="c41f8547ae985f2b" providerId="LiveId" clId="{7D15DF69-8A33-4A5F-A95C-BD15408E3D01}" dt="2018-06-02T20:07:32.991" v="3292" actId="14100"/>
-        <pc:sldMkLst>
-          <pc:docMk/>
-          <pc:sldMk cId="4265778210" sldId="271"/>
-        </pc:sldMkLst>
-        <pc:spChg chg="add mod">
-          <ac:chgData name="Geoff Coyner" userId="c41f8547ae985f2b" providerId="LiveId" clId="{7D15DF69-8A33-4A5F-A95C-BD15408E3D01}" dt="2018-06-02T20:07:32.991" v="3292" actId="14100"/>
-          <ac:spMkLst>
-            <pc:docMk/>
-            <pc:sldMk cId="4265778210" sldId="271"/>
-            <ac:spMk id="4" creationId="{C42BEE23-9F3C-4C79-9AE3-0CF4FD98AEF8}"/>
-          </ac:spMkLst>
-        </pc:spChg>
-      </pc:sldChg>
-      <pc:sldChg chg="addSp modSp">
-        <pc:chgData name="Geoff Coyner" userId="c41f8547ae985f2b" providerId="LiveId" clId="{7D15DF69-8A33-4A5F-A95C-BD15408E3D01}" dt="2018-06-02T20:07:39.216" v="3298" actId="20577"/>
-        <pc:sldMkLst>
-          <pc:docMk/>
-          <pc:sldMk cId="1007286814" sldId="272"/>
-        </pc:sldMkLst>
-        <pc:spChg chg="add mod">
-          <ac:chgData name="Geoff Coyner" userId="c41f8547ae985f2b" providerId="LiveId" clId="{7D15DF69-8A33-4A5F-A95C-BD15408E3D01}" dt="2018-06-02T20:07:39.216" v="3298" actId="20577"/>
-          <ac:spMkLst>
-            <pc:docMk/>
-            <pc:sldMk cId="1007286814" sldId="272"/>
-            <ac:spMk id="4" creationId="{888FDCD5-9522-4DA4-8A03-845A7E208D22}"/>
-          </ac:spMkLst>
-        </pc:spChg>
-      </pc:sldChg>
-      <pc:sldChg chg="addSp modSp">
-        <pc:chgData name="Geoff Coyner" userId="c41f8547ae985f2b" providerId="LiveId" clId="{7D15DF69-8A33-4A5F-A95C-BD15408E3D01}" dt="2018-06-02T20:40:12.730" v="4025" actId="20577"/>
-        <pc:sldMkLst>
-          <pc:docMk/>
-          <pc:sldMk cId="2547862235" sldId="273"/>
-        </pc:sldMkLst>
-        <pc:spChg chg="add mod">
-          <ac:chgData name="Geoff Coyner" userId="c41f8547ae985f2b" providerId="LiveId" clId="{7D15DF69-8A33-4A5F-A95C-BD15408E3D01}" dt="2018-06-02T20:40:12.730" v="4025" actId="20577"/>
-          <ac:spMkLst>
-            <pc:docMk/>
-            <pc:sldMk cId="2547862235" sldId="273"/>
-            <ac:spMk id="4" creationId="{41C664C5-F9E9-4F7E-AD36-B44F79DDDD99}"/>
-          </ac:spMkLst>
-        </pc:spChg>
-      </pc:sldChg>
-      <pc:sldChg chg="addSp delSp modSp mod setBg modNotesTx">
-        <pc:chgData name="Geoff Coyner" userId="c41f8547ae985f2b" providerId="LiveId" clId="{7D15DF69-8A33-4A5F-A95C-BD15408E3D01}" dt="2018-06-02T20:14:31.530" v="3639"/>
-        <pc:sldMkLst>
-          <pc:docMk/>
-          <pc:sldMk cId="1823230226" sldId="274"/>
-        </pc:sldMkLst>
-        <pc:spChg chg="mod ord">
-          <ac:chgData name="Geoff Coyner" userId="c41f8547ae985f2b" providerId="LiveId" clId="{7D15DF69-8A33-4A5F-A95C-BD15408E3D01}" dt="2018-06-02T20:08:34.896" v="3309" actId="113"/>
-          <ac:spMkLst>
-            <pc:docMk/>
-            <pc:sldMk cId="1823230226" sldId="274"/>
-            <ac:spMk id="2" creationId="{86189C1A-3CAA-48AE-A536-5BEB59FE3C1C}"/>
-          </ac:spMkLst>
-        </pc:spChg>
-        <pc:spChg chg="mod ord">
-          <ac:chgData name="Geoff Coyner" userId="c41f8547ae985f2b" providerId="LiveId" clId="{7D15DF69-8A33-4A5F-A95C-BD15408E3D01}" dt="2018-06-02T20:11:49.640" v="3602" actId="20577"/>
-          <ac:spMkLst>
-            <pc:docMk/>
-            <pc:sldMk cId="1823230226" sldId="274"/>
-            <ac:spMk id="3" creationId="{773FD40D-03CC-41A4-B4D8-ECA1FB38BB48}"/>
-          </ac:spMkLst>
-        </pc:spChg>
-        <pc:spChg chg="add del mod">
-          <ac:chgData name="Geoff Coyner" userId="c41f8547ae985f2b" providerId="LiveId" clId="{7D15DF69-8A33-4A5F-A95C-BD15408E3D01}" dt="2018-06-02T20:10:03.555" v="3414" actId="478"/>
-          <ac:spMkLst>
-            <pc:docMk/>
-            <pc:sldMk cId="1823230226" sldId="274"/>
-            <ac:spMk id="6" creationId="{B57B71AF-45DA-43B4-B84E-70E95B355865}"/>
-          </ac:spMkLst>
-        </pc:spChg>
-        <pc:spChg chg="add mod">
-          <ac:chgData name="Geoff Coyner" userId="c41f8547ae985f2b" providerId="LiveId" clId="{7D15DF69-8A33-4A5F-A95C-BD15408E3D01}" dt="2018-06-02T20:10:00.565" v="3413" actId="1076"/>
-          <ac:spMkLst>
-            <pc:docMk/>
-            <pc:sldMk cId="1823230226" sldId="274"/>
-            <ac:spMk id="7" creationId="{34CD3A3F-101C-4831-A59E-28D31776FF20}"/>
-          </ac:spMkLst>
-        </pc:spChg>
-        <pc:spChg chg="add del">
-          <ac:chgData name="Geoff Coyner" userId="c41f8547ae985f2b" providerId="LiveId" clId="{7D15DF69-8A33-4A5F-A95C-BD15408E3D01}" dt="2018-06-02T20:08:13.037" v="3302" actId="26606"/>
-          <ac:spMkLst>
-            <pc:docMk/>
-            <pc:sldMk cId="1823230226" sldId="274"/>
-            <ac:spMk id="11" creationId="{867D4867-5BA7-4462-B2F6-A23F4A622AA7}"/>
-          </ac:spMkLst>
-        </pc:spChg>
-        <pc:spChg chg="add del">
-          <ac:chgData name="Geoff Coyner" userId="c41f8547ae985f2b" providerId="LiveId" clId="{7D15DF69-8A33-4A5F-A95C-BD15408E3D01}" dt="2018-06-02T20:08:29.125" v="3304" actId="26606"/>
-          <ac:spMkLst>
-            <pc:docMk/>
-            <pc:sldMk cId="1823230226" sldId="274"/>
-            <ac:spMk id="13" creationId="{839DC788-B140-4F3E-A91E-CB3E70ED940A}"/>
-          </ac:spMkLst>
-        </pc:spChg>
-        <pc:spChg chg="add del">
-          <ac:chgData name="Geoff Coyner" userId="c41f8547ae985f2b" providerId="LiveId" clId="{7D15DF69-8A33-4A5F-A95C-BD15408E3D01}" dt="2018-06-02T20:08:29.125" v="3304" actId="26606"/>
-          <ac:spMkLst>
-            <pc:docMk/>
-            <pc:sldMk cId="1823230226" sldId="274"/>
-            <ac:spMk id="14" creationId="{3BAF1561-20C4-41FD-A35F-BF2B9E727F3E}"/>
-          </ac:spMkLst>
-        </pc:spChg>
-        <pc:spChg chg="add">
-          <ac:chgData name="Geoff Coyner" userId="c41f8547ae985f2b" providerId="LiveId" clId="{7D15DF69-8A33-4A5F-A95C-BD15408E3D01}" dt="2018-06-02T20:08:29.125" v="3304" actId="26606"/>
-          <ac:spMkLst>
-            <pc:docMk/>
-            <pc:sldMk cId="1823230226" sldId="274"/>
-            <ac:spMk id="20" creationId="{867D4867-5BA7-4462-B2F6-A23F4A622AA7}"/>
-          </ac:spMkLst>
-        </pc:spChg>
-        <pc:picChg chg="add del mod">
-          <ac:chgData name="Geoff Coyner" userId="c41f8547ae985f2b" providerId="LiveId" clId="{7D15DF69-8A33-4A5F-A95C-BD15408E3D01}" dt="2018-06-02T20:04:09.776" v="2609" actId="478"/>
-          <ac:picMkLst>
-            <pc:docMk/>
-            <pc:sldMk cId="1823230226" sldId="274"/>
-            <ac:picMk id="4" creationId="{677A6412-8DDB-41EC-A7C1-E93723FA69AC}"/>
-          </ac:picMkLst>
-        </pc:picChg>
-        <pc:picChg chg="add mod">
-          <ac:chgData name="Geoff Coyner" userId="c41f8547ae985f2b" providerId="LiveId" clId="{7D15DF69-8A33-4A5F-A95C-BD15408E3D01}" dt="2018-06-02T20:09:14.384" v="3322" actId="1076"/>
-          <ac:picMkLst>
-            <pc:docMk/>
-            <pc:sldMk cId="1823230226" sldId="274"/>
-            <ac:picMk id="5" creationId="{35B98844-9D71-4AE7-BAC5-983482D40878}"/>
-          </ac:picMkLst>
-        </pc:picChg>
-        <pc:picChg chg="add">
-          <ac:chgData name="Geoff Coyner" userId="c41f8547ae985f2b" providerId="LiveId" clId="{7D15DF69-8A33-4A5F-A95C-BD15408E3D01}" dt="2018-06-02T20:14:31.530" v="3639"/>
-          <ac:picMkLst>
-            <pc:docMk/>
-            <pc:sldMk cId="1823230226" sldId="274"/>
-            <ac:picMk id="16" creationId="{B6580146-F6BF-421C-B693-44C86D30E4FE}"/>
-          </ac:picMkLst>
-        </pc:picChg>
-        <pc:cxnChg chg="add del">
-          <ac:chgData name="Geoff Coyner" userId="c41f8547ae985f2b" providerId="LiveId" clId="{7D15DF69-8A33-4A5F-A95C-BD15408E3D01}" dt="2018-06-02T20:08:29.125" v="3304" actId="26606"/>
-          <ac:cxnSpMkLst>
-            <pc:docMk/>
-            <pc:sldMk cId="1823230226" sldId="274"/>
-            <ac:cxnSpMk id="15" creationId="{FC18D930-0EEE-448F-ABF1-2AA3C83DA552}"/>
-          </ac:cxnSpMkLst>
-        </pc:cxnChg>
-      </pc:sldChg>
-      <pc:sldChg chg="addSp modSp ord">
-        <pc:chgData name="Geoff Coyner" userId="c41f8547ae985f2b" providerId="LiveId" clId="{7D15DF69-8A33-4A5F-A95C-BD15408E3D01}" dt="2018-06-02T20:40:30.669" v="4027"/>
-        <pc:sldMkLst>
-          <pc:docMk/>
-          <pc:sldMk cId="561772038" sldId="275"/>
-        </pc:sldMkLst>
-        <pc:picChg chg="add mod">
-          <ac:chgData name="Geoff Coyner" userId="c41f8547ae985f2b" providerId="LiveId" clId="{7D15DF69-8A33-4A5F-A95C-BD15408E3D01}" dt="2018-06-02T19:32:00.893" v="1334" actId="14100"/>
-          <ac:picMkLst>
-            <pc:docMk/>
-            <pc:sldMk cId="561772038" sldId="275"/>
-            <ac:picMk id="4" creationId="{34109E0D-77D0-4BF3-9AB3-C560B65DD701}"/>
-          </ac:picMkLst>
-        </pc:picChg>
-      </pc:sldChg>
-      <pc:sldChg chg="addSp modSp">
-        <pc:chgData name="Geoff Coyner" userId="c41f8547ae985f2b" providerId="LiveId" clId="{7D15DF69-8A33-4A5F-A95C-BD15408E3D01}" dt="2018-06-02T20:13:40.407" v="3638" actId="1076"/>
-        <pc:sldMkLst>
-          <pc:docMk/>
-          <pc:sldMk cId="1209367033" sldId="276"/>
-        </pc:sldMkLst>
-        <pc:spChg chg="add mod">
-          <ac:chgData name="Geoff Coyner" userId="c41f8547ae985f2b" providerId="LiveId" clId="{7D15DF69-8A33-4A5F-A95C-BD15408E3D01}" dt="2018-06-02T20:13:40.407" v="3638" actId="1076"/>
-          <ac:spMkLst>
-            <pc:docMk/>
-            <pc:sldMk cId="1209367033" sldId="276"/>
-            <ac:spMk id="4" creationId="{B85C378E-F702-4DF5-8F8E-E9FB4FF7428C}"/>
-          </ac:spMkLst>
-        </pc:spChg>
-      </pc:sldChg>
-      <pc:sldChg chg="addSp">
-        <pc:chgData name="Geoff Coyner" userId="c41f8547ae985f2b" providerId="LiveId" clId="{7D15DF69-8A33-4A5F-A95C-BD15408E3D01}" dt="2018-06-02T20:40:17.127" v="4026"/>
-        <pc:sldMkLst>
-          <pc:docMk/>
-          <pc:sldMk cId="2260958738" sldId="277"/>
-        </pc:sldMkLst>
-        <pc:spChg chg="add">
-          <ac:chgData name="Geoff Coyner" userId="c41f8547ae985f2b" providerId="LiveId" clId="{7D15DF69-8A33-4A5F-A95C-BD15408E3D01}" dt="2018-06-02T20:40:17.127" v="4026"/>
-          <ac:spMkLst>
-            <pc:docMk/>
-            <pc:sldMk cId="2260958738" sldId="277"/>
-            <ac:spMk id="4" creationId="{E73F37E7-9392-43B6-BFE6-D5D494C8F8F2}"/>
-          </ac:spMkLst>
-        </pc:spChg>
-      </pc:sldChg>
-      <pc:sldChg chg="addSp delSp modSp add mod setBg">
-        <pc:chgData name="Geoff Coyner" userId="c41f8547ae985f2b" providerId="LiveId" clId="{7D15DF69-8A33-4A5F-A95C-BD15408E3D01}" dt="2018-06-02T20:35:44.263" v="3953" actId="1076"/>
-        <pc:sldMkLst>
-          <pc:docMk/>
-          <pc:sldMk cId="2068212353" sldId="278"/>
-        </pc:sldMkLst>
-        <pc:spChg chg="mod ord">
-          <ac:chgData name="Geoff Coyner" userId="c41f8547ae985f2b" providerId="LiveId" clId="{7D15DF69-8A33-4A5F-A95C-BD15408E3D01}" dt="2018-06-02T20:18:48.753" v="3683" actId="26606"/>
-          <ac:spMkLst>
-            <pc:docMk/>
-            <pc:sldMk cId="2068212353" sldId="278"/>
-            <ac:spMk id="2" creationId="{D934C231-386E-43FA-B4BC-C397FFF4B2E5}"/>
-          </ac:spMkLst>
-        </pc:spChg>
-        <pc:spChg chg="del">
-          <ac:chgData name="Geoff Coyner" userId="c41f8547ae985f2b" providerId="LiveId" clId="{7D15DF69-8A33-4A5F-A95C-BD15408E3D01}" dt="2018-06-02T19:02:26.395" v="45" actId="478"/>
-          <ac:spMkLst>
-            <pc:docMk/>
-            <pc:sldMk cId="2068212353" sldId="278"/>
-            <ac:spMk id="3" creationId="{48E99EA2-A054-43A4-9CD0-C148654F0976}"/>
-          </ac:spMkLst>
-        </pc:spChg>
-        <pc:spChg chg="add del mod">
-          <ac:chgData name="Geoff Coyner" userId="c41f8547ae985f2b" providerId="LiveId" clId="{7D15DF69-8A33-4A5F-A95C-BD15408E3D01}" dt="2018-06-02T20:18:48.753" v="3683" actId="26606"/>
-          <ac:spMkLst>
-            <pc:docMk/>
-            <pc:sldMk cId="2068212353" sldId="278"/>
-            <ac:spMk id="5" creationId="{0448DA8F-9740-4049-A1EE-BA44FCDEABAB}"/>
-          </ac:spMkLst>
-        </pc:spChg>
-        <pc:spChg chg="add del mod">
-          <ac:chgData name="Geoff Coyner" userId="c41f8547ae985f2b" providerId="LiveId" clId="{7D15DF69-8A33-4A5F-A95C-BD15408E3D01}" dt="2018-06-02T20:18:23.106" v="3680" actId="478"/>
-          <ac:spMkLst>
-            <pc:docMk/>
-            <pc:sldMk cId="2068212353" sldId="278"/>
-            <ac:spMk id="7" creationId="{2B7CDE7A-0B4E-40A9-9341-1A7E5BD04D25}"/>
-          </ac:spMkLst>
-        </pc:spChg>
-        <pc:spChg chg="add del mod">
-          <ac:chgData name="Geoff Coyner" userId="c41f8547ae985f2b" providerId="LiveId" clId="{7D15DF69-8A33-4A5F-A95C-BD15408E3D01}" dt="2018-06-02T20:18:20.802" v="3679" actId="478"/>
-          <ac:spMkLst>
-            <pc:docMk/>
-            <pc:sldMk cId="2068212353" sldId="278"/>
-            <ac:spMk id="8" creationId="{9A1F704E-A687-4C97-AE3B-588E67245384}"/>
-          </ac:spMkLst>
-        </pc:spChg>
-        <pc:spChg chg="add del">
-          <ac:chgData name="Geoff Coyner" userId="c41f8547ae985f2b" providerId="LiveId" clId="{7D15DF69-8A33-4A5F-A95C-BD15408E3D01}" dt="2018-06-02T20:18:48.541" v="3682" actId="26606"/>
-          <ac:spMkLst>
-            <pc:docMk/>
-            <pc:sldMk cId="2068212353" sldId="278"/>
-            <ac:spMk id="13" creationId="{BE95D989-81FA-4BAD-9AD5-E46CEDA91B36}"/>
-          </ac:spMkLst>
-        </pc:spChg>
-        <pc:spChg chg="add del">
-          <ac:chgData name="Geoff Coyner" userId="c41f8547ae985f2b" providerId="LiveId" clId="{7D15DF69-8A33-4A5F-A95C-BD15408E3D01}" dt="2018-06-02T20:18:48.541" v="3682" actId="26606"/>
-          <ac:spMkLst>
-            <pc:docMk/>
-            <pc:sldMk cId="2068212353" sldId="278"/>
-            <ac:spMk id="15" creationId="{156189E5-8A3E-4CFD-B71B-CCD0F8495E56}"/>
-          </ac:spMkLst>
-        </pc:spChg>
-        <pc:spChg chg="add">
-          <ac:chgData name="Geoff Coyner" userId="c41f8547ae985f2b" providerId="LiveId" clId="{7D15DF69-8A33-4A5F-A95C-BD15408E3D01}" dt="2018-06-02T20:18:48.753" v="3683" actId="26606"/>
-          <ac:spMkLst>
-            <pc:docMk/>
-            <pc:sldMk cId="2068212353" sldId="278"/>
-            <ac:spMk id="17" creationId="{BE95D989-81FA-4BAD-9AD5-E46CEDA91B36}"/>
-          </ac:spMkLst>
-        </pc:spChg>
-        <pc:spChg chg="add">
-          <ac:chgData name="Geoff Coyner" userId="c41f8547ae985f2b" providerId="LiveId" clId="{7D15DF69-8A33-4A5F-A95C-BD15408E3D01}" dt="2018-06-02T20:18:48.753" v="3683" actId="26606"/>
-          <ac:spMkLst>
-            <pc:docMk/>
-            <pc:sldMk cId="2068212353" sldId="278"/>
-            <ac:spMk id="18" creationId="{156189E5-8A3E-4CFD-B71B-CCD0F8495E56}"/>
-          </ac:spMkLst>
-        </pc:spChg>
-        <pc:graphicFrameChg chg="add del">
-          <ac:chgData name="Geoff Coyner" userId="c41f8547ae985f2b" providerId="LiveId" clId="{7D15DF69-8A33-4A5F-A95C-BD15408E3D01}" dt="2018-06-02T20:18:48.541" v="3682" actId="26606"/>
-          <ac:graphicFrameMkLst>
-            <pc:docMk/>
-            <pc:sldMk cId="2068212353" sldId="278"/>
-            <ac:graphicFrameMk id="9" creationId="{7ACF1575-C697-4056-A7C1-8784DFD776B5}"/>
-          </ac:graphicFrameMkLst>
-        </pc:graphicFrameChg>
-        <pc:graphicFrameChg chg="add mod">
-          <ac:chgData name="Geoff Coyner" userId="c41f8547ae985f2b" providerId="LiveId" clId="{7D15DF69-8A33-4A5F-A95C-BD15408E3D01}" dt="2018-06-02T20:35:44.263" v="3953" actId="1076"/>
-          <ac:graphicFrameMkLst>
-            <pc:docMk/>
-            <pc:sldMk cId="2068212353" sldId="278"/>
-            <ac:graphicFrameMk id="19" creationId="{08464258-64E0-459D-BFC6-E36606C4C6EF}"/>
-          </ac:graphicFrameMkLst>
-        </pc:graphicFrameChg>
-        <pc:picChg chg="add">
-          <ac:chgData name="Geoff Coyner" userId="c41f8547ae985f2b" providerId="LiveId" clId="{7D15DF69-8A33-4A5F-A95C-BD15408E3D01}" dt="2018-06-02T19:32:03.289" v="1335" actId="1076"/>
-          <ac:picMkLst>
-            <pc:docMk/>
-            <pc:sldMk cId="2068212353" sldId="278"/>
-            <ac:picMk id="6" creationId="{93594DCB-EE50-4880-9C64-2821F7C6769A}"/>
-          </ac:picMkLst>
-        </pc:picChg>
-        <pc:picChg chg="add del mod">
-          <ac:chgData name="Geoff Coyner" userId="c41f8547ae985f2b" providerId="LiveId" clId="{7D15DF69-8A33-4A5F-A95C-BD15408E3D01}" dt="2018-06-02T20:33:22.319" v="3837" actId="478"/>
-          <ac:picMkLst>
-            <pc:docMk/>
-            <pc:sldMk cId="2068212353" sldId="278"/>
-            <ac:picMk id="1026" creationId="{8BB987CD-0B3D-461D-BB55-1135485DC16E}"/>
-          </ac:picMkLst>
-        </pc:picChg>
-      </pc:sldChg>
-      <pc:sldChg chg="delSp add del setBg delDesignElem">
-        <pc:chgData name="Geoff Coyner" userId="c41f8547ae985f2b" providerId="LiveId" clId="{7D15DF69-8A33-4A5F-A95C-BD15408E3D01}" dt="2018-06-02T19:38:51.462" v="1765" actId="47"/>
-        <pc:sldMkLst>
-          <pc:docMk/>
-          <pc:sldMk cId="791420198" sldId="279"/>
-        </pc:sldMkLst>
-        <pc:spChg chg="del">
-          <ac:chgData name="Geoff Coyner" userId="c41f8547ae985f2b" providerId="LiveId" clId="{7D15DF69-8A33-4A5F-A95C-BD15408E3D01}" dt="2018-06-02T19:38:41.897" v="1756" actId="47"/>
-          <ac:spMkLst>
-            <pc:docMk/>
-            <pc:sldMk cId="791420198" sldId="279"/>
-            <ac:spMk id="14" creationId="{867D4867-5BA7-4462-B2F6-A23F4A622AA7}"/>
-          </ac:spMkLst>
-        </pc:spChg>
-      </pc:sldChg>
-      <pc:sldChg chg="delSp modSp add del setBg delDesignElem">
-        <pc:chgData name="Geoff Coyner" userId="c41f8547ae985f2b" providerId="LiveId" clId="{7D15DF69-8A33-4A5F-A95C-BD15408E3D01}" dt="2018-06-02T19:39:06.325" v="1772" actId="47"/>
-        <pc:sldMkLst>
-          <pc:docMk/>
-          <pc:sldMk cId="3222378768" sldId="279"/>
-        </pc:sldMkLst>
-        <pc:spChg chg="mod">
-          <ac:chgData name="Geoff Coyner" userId="c41f8547ae985f2b" providerId="LiveId" clId="{7D15DF69-8A33-4A5F-A95C-BD15408E3D01}" dt="2018-06-02T19:38:56.078" v="1769" actId="1076"/>
-          <ac:spMkLst>
-            <pc:docMk/>
-            <pc:sldMk cId="3222378768" sldId="279"/>
-            <ac:spMk id="3" creationId="{94ED32F1-C444-403D-9DB8-EDC87E620384}"/>
-          </ac:spMkLst>
-        </pc:spChg>
-        <pc:spChg chg="del">
-          <ac:chgData name="Geoff Coyner" userId="c41f8547ae985f2b" providerId="LiveId" clId="{7D15DF69-8A33-4A5F-A95C-BD15408E3D01}" dt="2018-06-02T19:38:53.547" v="1767" actId="47"/>
-          <ac:spMkLst>
-            <pc:docMk/>
-            <pc:sldMk cId="3222378768" sldId="279"/>
-            <ac:spMk id="14" creationId="{867D4867-5BA7-4462-B2F6-A23F4A622AA7}"/>
-          </ac:spMkLst>
-        </pc:spChg>
-      </pc:sldChg>
-      <pc:sldChg chg="addSp delSp modSp add modNotesTx">
-        <pc:chgData name="Geoff Coyner" userId="c41f8547ae985f2b" providerId="LiveId" clId="{7D15DF69-8A33-4A5F-A95C-BD15408E3D01}" dt="2018-06-02T20:36:29.373" v="3957" actId="688"/>
-        <pc:sldMkLst>
-          <pc:docMk/>
-          <pc:sldMk cId="3886834386" sldId="280"/>
-        </pc:sldMkLst>
-        <pc:spChg chg="mod">
-          <ac:chgData name="Geoff Coyner" userId="c41f8547ae985f2b" providerId="LiveId" clId="{7D15DF69-8A33-4A5F-A95C-BD15408E3D01}" dt="2018-06-02T20:18:17.769" v="3678" actId="20577"/>
-          <ac:spMkLst>
-            <pc:docMk/>
-            <pc:sldMk cId="3886834386" sldId="280"/>
-            <ac:spMk id="2" creationId="{421649CD-C4DB-4A73-B411-9C060ECFEEA6}"/>
-          </ac:spMkLst>
-        </pc:spChg>
-        <pc:spChg chg="mod">
-          <ac:chgData name="Geoff Coyner" userId="c41f8547ae985f2b" providerId="LiveId" clId="{7D15DF69-8A33-4A5F-A95C-BD15408E3D01}" dt="2018-06-02T19:51:29.781" v="2252" actId="20577"/>
-          <ac:spMkLst>
-            <pc:docMk/>
-            <pc:sldMk cId="3886834386" sldId="280"/>
-            <ac:spMk id="3" creationId="{94ED32F1-C444-403D-9DB8-EDC87E620384}"/>
-          </ac:spMkLst>
-        </pc:spChg>
-        <pc:picChg chg="del">
-          <ac:chgData name="Geoff Coyner" userId="c41f8547ae985f2b" providerId="LiveId" clId="{7D15DF69-8A33-4A5F-A95C-BD15408E3D01}" dt="2018-06-02T19:49:35.493" v="1970" actId="478"/>
-          <ac:picMkLst>
-            <pc:docMk/>
-            <pc:sldMk cId="3886834386" sldId="280"/>
-            <ac:picMk id="5" creationId="{32E613B2-EB9C-49DC-9974-0600DFD62A33}"/>
-          </ac:picMkLst>
-        </pc:picChg>
-        <pc:picChg chg="add del mod">
-          <ac:chgData name="Geoff Coyner" userId="c41f8547ae985f2b" providerId="LiveId" clId="{7D15DF69-8A33-4A5F-A95C-BD15408E3D01}" dt="2018-06-02T19:49:40.638" v="1973" actId="478"/>
-          <ac:picMkLst>
-            <pc:docMk/>
-            <pc:sldMk cId="3886834386" sldId="280"/>
-            <ac:picMk id="6" creationId="{A05DAC45-B385-4174-A8E7-A8D99CCFE288}"/>
-          </ac:picMkLst>
-        </pc:picChg>
-        <pc:picChg chg="add mod">
-          <ac:chgData name="Geoff Coyner" userId="c41f8547ae985f2b" providerId="LiveId" clId="{7D15DF69-8A33-4A5F-A95C-BD15408E3D01}" dt="2018-06-02T20:36:29.373" v="3957" actId="688"/>
-          <ac:picMkLst>
-            <pc:docMk/>
-            <pc:sldMk cId="3886834386" sldId="280"/>
-            <ac:picMk id="7" creationId="{F8F498A1-6441-4591-891C-88EDC0E24716}"/>
-          </ac:picMkLst>
-        </pc:picChg>
-      </pc:sldChg>
-      <pc:sldChg chg="addSp delSp modSp add ord modNotesTx">
-        <pc:chgData name="Geoff Coyner" userId="c41f8547ae985f2b" providerId="LiveId" clId="{7D15DF69-8A33-4A5F-A95C-BD15408E3D01}" dt="2018-06-02T20:01:32.835" v="2597" actId="20577"/>
-        <pc:sldMkLst>
-          <pc:docMk/>
-          <pc:sldMk cId="2155622509" sldId="281"/>
-        </pc:sldMkLst>
-        <pc:spChg chg="mod">
-          <ac:chgData name="Geoff Coyner" userId="c41f8547ae985f2b" providerId="LiveId" clId="{7D15DF69-8A33-4A5F-A95C-BD15408E3D01}" dt="2018-06-02T19:51:50.376" v="2267" actId="20577"/>
-          <ac:spMkLst>
-            <pc:docMk/>
-            <pc:sldMk cId="2155622509" sldId="281"/>
-            <ac:spMk id="2" creationId="{421649CD-C4DB-4A73-B411-9C060ECFEEA6}"/>
-          </ac:spMkLst>
-        </pc:spChg>
-        <pc:spChg chg="mod">
-          <ac:chgData name="Geoff Coyner" userId="c41f8547ae985f2b" providerId="LiveId" clId="{7D15DF69-8A33-4A5F-A95C-BD15408E3D01}" dt="2018-06-02T20:00:49.004" v="2565" actId="20577"/>
-          <ac:spMkLst>
-            <pc:docMk/>
-            <pc:sldMk cId="2155622509" sldId="281"/>
-            <ac:spMk id="3" creationId="{94ED32F1-C444-403D-9DB8-EDC87E620384}"/>
-          </ac:spMkLst>
-        </pc:spChg>
-        <pc:picChg chg="del">
-          <ac:chgData name="Geoff Coyner" userId="c41f8547ae985f2b" providerId="LiveId" clId="{7D15DF69-8A33-4A5F-A95C-BD15408E3D01}" dt="2018-06-02T20:01:20.371" v="2566" actId="478"/>
-          <ac:picMkLst>
-            <pc:docMk/>
-            <pc:sldMk cId="2155622509" sldId="281"/>
-            <ac:picMk id="5" creationId="{32E613B2-EB9C-49DC-9974-0600DFD62A33}"/>
-          </ac:picMkLst>
-        </pc:picChg>
-        <pc:picChg chg="add mod">
-          <ac:chgData name="Geoff Coyner" userId="c41f8547ae985f2b" providerId="LiveId" clId="{7D15DF69-8A33-4A5F-A95C-BD15408E3D01}" dt="2018-06-02T20:01:26.707" v="2570" actId="1076"/>
-          <ac:picMkLst>
-            <pc:docMk/>
-            <pc:sldMk cId="2155622509" sldId="281"/>
-            <ac:picMk id="6" creationId="{41643C9E-676E-4D6D-94C7-776907056B21}"/>
-          </ac:picMkLst>
-        </pc:picChg>
-      </pc:sldChg>
-      <pc:sldChg chg="delSp modSp add del">
-        <pc:chgData name="Geoff Coyner" userId="c41f8547ae985f2b" providerId="LiveId" clId="{7D15DF69-8A33-4A5F-A95C-BD15408E3D01}" dt="2018-06-02T20:12:41.343" v="3604" actId="47"/>
-        <pc:sldMkLst>
-          <pc:docMk/>
-          <pc:sldMk cId="2990905550" sldId="282"/>
-        </pc:sldMkLst>
-        <pc:picChg chg="del mod">
-          <ac:chgData name="Geoff Coyner" userId="c41f8547ae985f2b" providerId="LiveId" clId="{7D15DF69-8A33-4A5F-A95C-BD15408E3D01}" dt="2018-06-02T20:08:53.135" v="3312" actId="47"/>
-          <ac:picMkLst>
-            <pc:docMk/>
-            <pc:sldMk cId="2990905550" sldId="282"/>
-            <ac:picMk id="4" creationId="{677A6412-8DDB-41EC-A7C1-E93723FA69AC}"/>
-          </ac:picMkLst>
-        </pc:picChg>
-        <pc:picChg chg="del">
-          <ac:chgData name="Geoff Coyner" userId="c41f8547ae985f2b" providerId="LiveId" clId="{7D15DF69-8A33-4A5F-A95C-BD15408E3D01}" dt="2018-06-02T20:04:02.646" v="2606" actId="478"/>
-          <ac:picMkLst>
-            <pc:docMk/>
-            <pc:sldMk cId="2990905550" sldId="282"/>
-            <ac:picMk id="5" creationId="{35B98844-9D71-4AE7-BAC5-983482D40878}"/>
-          </ac:picMkLst>
-        </pc:picChg>
-      </pc:sldChg>
-      <pc:sldChg chg="addSp delSp modSp add">
-        <pc:chgData name="Geoff Coyner" userId="c41f8547ae985f2b" providerId="LiveId" clId="{7D15DF69-8A33-4A5F-A95C-BD15408E3D01}" dt="2018-06-02T20:14:33.423" v="3640"/>
-        <pc:sldMkLst>
-          <pc:docMk/>
-          <pc:sldMk cId="3014560072" sldId="283"/>
-        </pc:sldMkLst>
-        <pc:spChg chg="mod">
-          <ac:chgData name="Geoff Coyner" userId="c41f8547ae985f2b" providerId="LiveId" clId="{7D15DF69-8A33-4A5F-A95C-BD15408E3D01}" dt="2018-06-02T20:12:04.331" v="3603"/>
-          <ac:spMkLst>
-            <pc:docMk/>
-            <pc:sldMk cId="3014560072" sldId="283"/>
-            <ac:spMk id="3" creationId="{773FD40D-03CC-41A4-B4D8-ECA1FB38BB48}"/>
-          </ac:spMkLst>
-        </pc:spChg>
-        <pc:spChg chg="add mod">
-          <ac:chgData name="Geoff Coyner" userId="c41f8547ae985f2b" providerId="LiveId" clId="{7D15DF69-8A33-4A5F-A95C-BD15408E3D01}" dt="2018-06-02T20:11:25.093" v="3578" actId="1076"/>
-          <ac:spMkLst>
-            <pc:docMk/>
-            <pc:sldMk cId="3014560072" sldId="283"/>
-            <ac:spMk id="8" creationId="{1FBFF041-66A5-4FD3-BB10-BDEBB52FD7B8}"/>
-          </ac:spMkLst>
-        </pc:spChg>
-        <pc:picChg chg="del">
-          <ac:chgData name="Geoff Coyner" userId="c41f8547ae985f2b" providerId="LiveId" clId="{7D15DF69-8A33-4A5F-A95C-BD15408E3D01}" dt="2018-06-02T20:08:55.641" v="3313" actId="478"/>
-          <ac:picMkLst>
-            <pc:docMk/>
-            <pc:sldMk cId="3014560072" sldId="283"/>
-            <ac:picMk id="5" creationId="{35B98844-9D71-4AE7-BAC5-983482D40878}"/>
-          </ac:picMkLst>
-        </pc:picChg>
-        <pc:picChg chg="add">
-          <ac:chgData name="Geoff Coyner" userId="c41f8547ae985f2b" providerId="LiveId" clId="{7D15DF69-8A33-4A5F-A95C-BD15408E3D01}" dt="2018-06-02T20:08:55.984" v="3314"/>
-          <ac:picMkLst>
-            <pc:docMk/>
-            <pc:sldMk cId="3014560072" sldId="283"/>
-            <ac:picMk id="7" creationId="{DC15119F-FFFA-474F-A6F5-1A92B9AE3AD1}"/>
-          </ac:picMkLst>
-        </pc:picChg>
-        <pc:picChg chg="add">
-          <ac:chgData name="Geoff Coyner" userId="c41f8547ae985f2b" providerId="LiveId" clId="{7D15DF69-8A33-4A5F-A95C-BD15408E3D01}" dt="2018-06-02T20:14:33.423" v="3640"/>
-          <ac:picMkLst>
-            <pc:docMk/>
-            <pc:sldMk cId="3014560072" sldId="283"/>
-            <ac:picMk id="9" creationId="{7CA95E84-B0E6-4F9A-900E-EDCA04B079A0}"/>
-          </ac:picMkLst>
-        </pc:picChg>
-      </pc:sldChg>
-      <pc:sldChg chg="addSp delSp modSp add mod setBg setClrOvrMap">
-        <pc:chgData name="Geoff Coyner" userId="c41f8547ae985f2b" providerId="LiveId" clId="{7D15DF69-8A33-4A5F-A95C-BD15408E3D01}" dt="2018-06-02T20:39:30.172" v="3989" actId="14100"/>
-        <pc:sldMkLst>
-          <pc:docMk/>
-          <pc:sldMk cId="2047678405" sldId="284"/>
-        </pc:sldMkLst>
-        <pc:spChg chg="mod">
-          <ac:chgData name="Geoff Coyner" userId="c41f8547ae985f2b" providerId="LiveId" clId="{7D15DF69-8A33-4A5F-A95C-BD15408E3D01}" dt="2018-06-02T20:39:21.815" v="3988" actId="26606"/>
-          <ac:spMkLst>
-            <pc:docMk/>
-            <pc:sldMk cId="2047678405" sldId="284"/>
-            <ac:spMk id="2" creationId="{86189C1A-3CAA-48AE-A536-5BEB59FE3C1C}"/>
-          </ac:spMkLst>
-        </pc:spChg>
-        <pc:spChg chg="del mod">
-          <ac:chgData name="Geoff Coyner" userId="c41f8547ae985f2b" providerId="LiveId" clId="{7D15DF69-8A33-4A5F-A95C-BD15408E3D01}" dt="2018-06-02T20:39:21.815" v="3988" actId="26606"/>
-          <ac:spMkLst>
-            <pc:docMk/>
-            <pc:sldMk cId="2047678405" sldId="284"/>
-            <ac:spMk id="3" creationId="{773FD40D-03CC-41A4-B4D8-ECA1FB38BB48}"/>
-          </ac:spMkLst>
-        </pc:spChg>
-        <pc:spChg chg="del">
-          <ac:chgData name="Geoff Coyner" userId="c41f8547ae985f2b" providerId="LiveId" clId="{7D15DF69-8A33-4A5F-A95C-BD15408E3D01}" dt="2018-06-02T20:37:38.371" v="3965" actId="478"/>
-          <ac:spMkLst>
-            <pc:docMk/>
-            <pc:sldMk cId="2047678405" sldId="284"/>
-            <ac:spMk id="8" creationId="{1FBFF041-66A5-4FD3-BB10-BDEBB52FD7B8}"/>
-          </ac:spMkLst>
-        </pc:spChg>
-        <pc:spChg chg="add del">
-          <ac:chgData name="Geoff Coyner" userId="c41f8547ae985f2b" providerId="LiveId" clId="{7D15DF69-8A33-4A5F-A95C-BD15408E3D01}" dt="2018-06-02T20:38:26.023" v="3980" actId="26606"/>
-          <ac:spMkLst>
-            <pc:docMk/>
-            <pc:sldMk cId="2047678405" sldId="284"/>
-            <ac:spMk id="20" creationId="{867D4867-5BA7-4462-B2F6-A23F4A622AA7}"/>
-          </ac:spMkLst>
-        </pc:spChg>
-        <pc:spChg chg="add del">
-          <ac:chgData name="Geoff Coyner" userId="c41f8547ae985f2b" providerId="LiveId" clId="{7D15DF69-8A33-4A5F-A95C-BD15408E3D01}" dt="2018-06-02T20:38:21.318" v="3977" actId="26606"/>
-          <ac:spMkLst>
-            <pc:docMk/>
-            <pc:sldMk cId="2047678405" sldId="284"/>
-            <ac:spMk id="25" creationId="{179F7551-E956-43CB-8F36-268A5DA443BE}"/>
-          </ac:spMkLst>
-        </pc:spChg>
-        <pc:spChg chg="add del">
-          <ac:chgData name="Geoff Coyner" userId="c41f8547ae985f2b" providerId="LiveId" clId="{7D15DF69-8A33-4A5F-A95C-BD15408E3D01}" dt="2018-06-02T20:38:21.318" v="3977" actId="26606"/>
-          <ac:spMkLst>
-            <pc:docMk/>
-            <pc:sldMk cId="2047678405" sldId="284"/>
-            <ac:spMk id="27" creationId="{41A48365-B48D-490D-A7DE-D85CC9AD2FD7}"/>
-          </ac:spMkLst>
-        </pc:spChg>
-        <pc:spChg chg="add del">
-          <ac:chgData name="Geoff Coyner" userId="c41f8547ae985f2b" providerId="LiveId" clId="{7D15DF69-8A33-4A5F-A95C-BD15408E3D01}" dt="2018-06-02T20:38:21.318" v="3977" actId="26606"/>
-          <ac:spMkLst>
-            <pc:docMk/>
-            <pc:sldMk cId="2047678405" sldId="284"/>
-            <ac:spMk id="29" creationId="{521F05AC-2996-48A9-9B40-1A0FC53D769B}"/>
-          </ac:spMkLst>
-        </pc:spChg>
-        <pc:spChg chg="add del">
-          <ac:chgData name="Geoff Coyner" userId="c41f8547ae985f2b" providerId="LiveId" clId="{7D15DF69-8A33-4A5F-A95C-BD15408E3D01}" dt="2018-06-02T20:38:26.007" v="3979" actId="26606"/>
-          <ac:spMkLst>
-            <pc:docMk/>
-            <pc:sldMk cId="2047678405" sldId="284"/>
-            <ac:spMk id="31" creationId="{4038CB10-1F5C-4D54-9DF7-12586DE5B007}"/>
-          </ac:spMkLst>
-        </pc:spChg>
-        <pc:spChg chg="add del">
-          <ac:chgData name="Geoff Coyner" userId="c41f8547ae985f2b" providerId="LiveId" clId="{7D15DF69-8A33-4A5F-A95C-BD15408E3D01}" dt="2018-06-02T20:38:26.007" v="3979" actId="26606"/>
-          <ac:spMkLst>
-            <pc:docMk/>
-            <pc:sldMk cId="2047678405" sldId="284"/>
-            <ac:spMk id="32" creationId="{73ED6512-6858-4552-B699-9A97FE9A4EA2}"/>
-          </ac:spMkLst>
-        </pc:spChg>
-        <pc:spChg chg="add del">
-          <ac:chgData name="Geoff Coyner" userId="c41f8547ae985f2b" providerId="LiveId" clId="{7D15DF69-8A33-4A5F-A95C-BD15408E3D01}" dt="2018-06-02T20:39:21.815" v="3988" actId="26606"/>
-          <ac:spMkLst>
-            <pc:docMk/>
-            <pc:sldMk cId="2047678405" sldId="284"/>
-            <ac:spMk id="34" creationId="{546C4E63-5F8D-44B8-9860-1D7841E3D236}"/>
-          </ac:spMkLst>
-        </pc:spChg>
-        <pc:spChg chg="add del">
-          <ac:chgData name="Geoff Coyner" userId="c41f8547ae985f2b" providerId="LiveId" clId="{7D15DF69-8A33-4A5F-A95C-BD15408E3D01}" dt="2018-06-02T20:39:21.815" v="3988" actId="26606"/>
-          <ac:spMkLst>
-            <pc:docMk/>
-            <pc:sldMk cId="2047678405" sldId="284"/>
-            <ac:spMk id="35" creationId="{E862BE82-D00D-42C1-BF16-93AA37870C32}"/>
-          </ac:spMkLst>
-        </pc:spChg>
-        <pc:spChg chg="add del">
-          <ac:chgData name="Geoff Coyner" userId="c41f8547ae985f2b" providerId="LiveId" clId="{7D15DF69-8A33-4A5F-A95C-BD15408E3D01}" dt="2018-06-02T20:39:21.815" v="3988" actId="26606"/>
-          <ac:spMkLst>
-            <pc:docMk/>
-            <pc:sldMk cId="2047678405" sldId="284"/>
-            <ac:spMk id="36" creationId="{F6D92C2D-1D3D-4974-918C-06579FB354A9}"/>
-          </ac:spMkLst>
-        </pc:spChg>
-        <pc:spChg chg="add">
-          <ac:chgData name="Geoff Coyner" userId="c41f8547ae985f2b" providerId="LiveId" clId="{7D15DF69-8A33-4A5F-A95C-BD15408E3D01}" dt="2018-06-02T20:39:21.815" v="3988" actId="26606"/>
-          <ac:spMkLst>
-            <pc:docMk/>
-            <pc:sldMk cId="2047678405" sldId="284"/>
-            <ac:spMk id="42" creationId="{1707FC24-6981-43D9-B525-C7832BA22463}"/>
-          </ac:spMkLst>
-        </pc:spChg>
-        <pc:picChg chg="add del mod ord">
-          <ac:chgData name="Geoff Coyner" userId="c41f8547ae985f2b" providerId="LiveId" clId="{7D15DF69-8A33-4A5F-A95C-BD15408E3D01}" dt="2018-06-02T20:39:21.815" v="3988" actId="26606"/>
-          <ac:picMkLst>
-            <pc:docMk/>
-            <pc:sldMk cId="2047678405" sldId="284"/>
-            <ac:picMk id="4" creationId="{BEBE91F5-B425-478A-BB67-C82B79ACBD67}"/>
-          </ac:picMkLst>
-        </pc:picChg>
-        <pc:picChg chg="del">
-          <ac:chgData name="Geoff Coyner" userId="c41f8547ae985f2b" providerId="LiveId" clId="{7D15DF69-8A33-4A5F-A95C-BD15408E3D01}" dt="2018-06-02T20:37:38.371" v="3965" actId="478"/>
-          <ac:picMkLst>
-            <pc:docMk/>
-            <pc:sldMk cId="2047678405" sldId="284"/>
-            <ac:picMk id="7" creationId="{DC15119F-FFFA-474F-A6F5-1A92B9AE3AD1}"/>
-          </ac:picMkLst>
-        </pc:picChg>
-        <pc:picChg chg="ord">
-          <ac:chgData name="Geoff Coyner" userId="c41f8547ae985f2b" providerId="LiveId" clId="{7D15DF69-8A33-4A5F-A95C-BD15408E3D01}" dt="2018-06-02T20:38:26.023" v="3980" actId="26606"/>
-          <ac:picMkLst>
-            <pc:docMk/>
-            <pc:sldMk cId="2047678405" sldId="284"/>
-            <ac:picMk id="9" creationId="{7CA95E84-B0E6-4F9A-900E-EDCA04B079A0}"/>
-          </ac:picMkLst>
-        </pc:picChg>
-        <pc:picChg chg="add mod">
-          <ac:chgData name="Geoff Coyner" userId="c41f8547ae985f2b" providerId="LiveId" clId="{7D15DF69-8A33-4A5F-A95C-BD15408E3D01}" dt="2018-06-02T20:39:30.172" v="3989" actId="14100"/>
-          <ac:picMkLst>
-            <pc:docMk/>
-            <pc:sldMk cId="2047678405" sldId="284"/>
-            <ac:picMk id="39" creationId="{BEBE91F5-B425-478A-BB67-C82B79ACBD67}"/>
-          </ac:picMkLst>
-        </pc:picChg>
-      </pc:sldChg>
-    </pc:docChg>
-  </pc:docChgLst>
-</pc:chgInfo>
 </file>
 
 <file path=ppt/diagrams/colors1.xml><?xml version="1.0" encoding="utf-8"?>
@@ -12489,7 +11486,43 @@
                   <a:schemeClr val="bg1"/>
                 </a:solidFill>
               </a:rPr>
-              <a:t>Visualize </a:t>
+              <a:t>Assign a neighborhood to each collision based on shape file</a:t>
+            </a:r>
+          </a:p>
+          <a:p>
+            <a:r>
+              <a:rPr lang="en-US" sz="2000" dirty="0">
+                <a:solidFill>
+                  <a:schemeClr val="bg1"/>
+                </a:solidFill>
+              </a:rPr>
+              <a:t>Visualize data per neighborhood</a:t>
+            </a:r>
+          </a:p>
+          <a:p>
+            <a:r>
+              <a:rPr lang="en-US" sz="2000" dirty="0">
+                <a:solidFill>
+                  <a:schemeClr val="bg1"/>
+                </a:solidFill>
+              </a:rPr>
+              <a:t>Use interactive drop down to </a:t>
+            </a:r>
+            <a:r>
+              <a:rPr lang="en-US" sz="2000" dirty="0" err="1">
+                <a:solidFill>
+                  <a:schemeClr val="bg1"/>
+                </a:solidFill>
+              </a:rPr>
+              <a:t>analyse</a:t>
+            </a:r>
+            <a:r>
+              <a:rPr lang="en-US" sz="2000" dirty="0">
+                <a:solidFill>
+                  <a:schemeClr val="bg1"/>
+                </a:solidFill>
+              </a:rPr>
+              <a:t> data.</a:t>
             </a:r>
           </a:p>
           <a:p>
@@ -12508,6 +11541,42 @@
           </a:p>
         </p:txBody>
       </p:sp>
+      <p:pic>
+        <p:nvPicPr>
+          <p:cNvPr id="6" name="Picture 5">
+            <a:extLst>
+              <a:ext uri="{FF2B5EF4-FFF2-40B4-BE49-F238E27FC236}">
+                <a16:creationId xmlns:a16="http://schemas.microsoft.com/office/drawing/2014/main" id="{AF899A9B-C221-4609-9EA5-7A74BE25AF6D}"/>
+              </a:ext>
+            </a:extLst>
+          </p:cNvPr>
+          <p:cNvPicPr>
+            <a:picLocks noChangeAspect="1"/>
+          </p:cNvPicPr>
+          <p:nvPr/>
+        </p:nvPicPr>
+        <p:blipFill>
+          <a:blip r:embed="rId4">
+            <a:extLst>
+              <a:ext uri="{28A0092B-C50C-407E-A947-70E740481C1C}">
+                <a14:useLocalDpi xmlns:a14="http://schemas.microsoft.com/office/drawing/2010/main" val="0"/>
+              </a:ext>
+            </a:extLst>
+          </a:blip>
+          <a:stretch>
+            <a:fillRect/>
+          </a:stretch>
+        </p:blipFill>
+        <p:spPr>
+          <a:xfrm>
+            <a:off x="4843686" y="1740493"/>
+            <a:ext cx="7145481" cy="4473693"/>
+          </a:xfrm>
+          <a:prstGeom prst="rect">
+            <a:avLst/>
+          </a:prstGeom>
+        </p:spPr>
+      </p:pic>
     </p:spTree>
     <p:extLst>
       <p:ext uri="{BB962C8B-B14F-4D97-AF65-F5344CB8AC3E}">
@@ -14389,7 +13458,7 @@
         </p:nvSpPr>
         <p:spPr>
           <a:xfrm>
-            <a:off x="2528514" y="2108468"/>
+            <a:off x="5486318" y="270337"/>
             <a:ext cx="6909684" cy="2554545"/>
           </a:xfrm>
           <a:prstGeom prst="rect">

</xml_diff>